<commit_message>
if condition and variables
</commit_message>
<xml_diff>
--- a/PPT/JavaScriptTraining.pptx
+++ b/PPT/JavaScriptTraining.pptx
@@ -7,6 +7,8 @@
   <p:sldIdLst>
     <p:sldId id="256" r:id="rId2"/>
     <p:sldId id="257" r:id="rId3"/>
+    <p:sldId id="258" r:id="rId4"/>
+    <p:sldId id="259" r:id="rId5"/>
   </p:sldIdLst>
   <p:sldSz cx="12192000" cy="6858000"/>
   <p:notesSz cx="6858000" cy="9144000"/>
@@ -105,15 +107,20 @@
       </a:defRPr>
     </a:lvl9pPr>
   </p:defaultTextStyle>
+  <p:extLst>
+    <p:ext uri="{EFAFB233-063F-42B5-8137-9DF3F51BA10A}">
+      <p15:sldGuideLst xmlns:p15="http://schemas.microsoft.com/office/powerpoint/2012/main"/>
+    </p:ext>
+  </p:extLst>
 </p:presentation>
 </file>
 
 <file path=ppt/diagrams/colors1.xml><?xml version="1.0" encoding="utf-8"?>
-<dgm:colorsDef xmlns:dgm="http://schemas.openxmlformats.org/drawingml/2006/diagram" xmlns:a="http://schemas.openxmlformats.org/drawingml/2006/main" uniqueId="urn:microsoft.com/office/officeart/2018/5/colors/Iconchunking_neutralbg_colorful1">
+<dgm:colorsDef xmlns:dgm="http://schemas.openxmlformats.org/drawingml/2006/diagram" xmlns:a="http://schemas.openxmlformats.org/drawingml/2006/main" uniqueId="urn:microsoft.com/office/officeart/2005/8/colors/accent1_2">
   <dgm:title val=""/>
   <dgm:desc val=""/>
   <dgm:catLst>
-    <dgm:cat type="colorful" pri="10100"/>
+    <dgm:cat type="accent1" pri="11200"/>
   </dgm:catLst>
   <dgm:styleLbl name="node0">
     <dgm:fillClrLst meth="repeat">
@@ -127,38 +134,24 @@
     <dgm:txFillClrLst/>
     <dgm:txEffectClrLst/>
   </dgm:styleLbl>
-  <dgm:styleLbl name="node1">
+  <dgm:styleLbl name="alignNode1">
     <dgm:fillClrLst meth="repeat">
-      <a:schemeClr val="accent2"/>
-      <a:schemeClr val="accent3"/>
-      <a:schemeClr val="accent4"/>
-      <a:schemeClr val="accent5"/>
-      <a:schemeClr val="accent6"/>
+      <a:schemeClr val="accent1"/>
     </dgm:fillClrLst>
     <dgm:linClrLst meth="repeat">
-      <a:schemeClr val="lt1">
-        <a:alpha val="0"/>
-      </a:schemeClr>
+      <a:schemeClr val="accent1"/>
     </dgm:linClrLst>
     <dgm:effectClrLst/>
     <dgm:txLinClrLst/>
     <dgm:txFillClrLst/>
     <dgm:txEffectClrLst/>
   </dgm:styleLbl>
-  <dgm:styleLbl name="alignNode1">
+  <dgm:styleLbl name="node1">
     <dgm:fillClrLst meth="repeat">
-      <a:schemeClr val="accent2"/>
-      <a:schemeClr val="accent3"/>
-      <a:schemeClr val="accent4"/>
-      <a:schemeClr val="accent5"/>
-      <a:schemeClr val="accent6"/>
+      <a:schemeClr val="accent1"/>
     </dgm:fillClrLst>
     <dgm:linClrLst meth="repeat">
-      <a:schemeClr val="accent2"/>
-      <a:schemeClr val="accent3"/>
-      <a:schemeClr val="accent4"/>
-      <a:schemeClr val="accent5"/>
-      <a:schemeClr val="accent6"/>
+      <a:schemeClr val="lt1"/>
     </dgm:linClrLst>
     <dgm:effectClrLst/>
     <dgm:txLinClrLst/>
@@ -167,11 +160,7 @@
   </dgm:styleLbl>
   <dgm:styleLbl name="lnNode1">
     <dgm:fillClrLst meth="repeat">
-      <a:schemeClr val="accent2"/>
-      <a:schemeClr val="accent3"/>
-      <a:schemeClr val="accent4"/>
-      <a:schemeClr val="accent5"/>
-      <a:schemeClr val="accent6"/>
+      <a:schemeClr val="accent1"/>
     </dgm:fillClrLst>
     <dgm:linClrLst meth="repeat">
       <a:schemeClr val="lt1"/>
@@ -183,19 +172,7 @@
   </dgm:styleLbl>
   <dgm:styleLbl name="vennNode1">
     <dgm:fillClrLst meth="repeat">
-      <a:schemeClr val="accent2">
-        <a:alpha val="50000"/>
-      </a:schemeClr>
-      <a:schemeClr val="accent3">
-        <a:alpha val="50000"/>
-      </a:schemeClr>
-      <a:schemeClr val="accent4">
-        <a:alpha val="50000"/>
-      </a:schemeClr>
-      <a:schemeClr val="accent5">
-        <a:alpha val="50000"/>
-      </a:schemeClr>
-      <a:schemeClr val="accent6">
+      <a:schemeClr val="accent1">
         <a:alpha val="50000"/>
       </a:schemeClr>
     </dgm:fillClrLst>
@@ -208,8 +185,8 @@
     <dgm:txEffectClrLst/>
   </dgm:styleLbl>
   <dgm:styleLbl name="node2">
-    <dgm:fillClrLst>
-      <a:schemeClr val="accent2"/>
+    <dgm:fillClrLst meth="repeat">
+      <a:schemeClr val="accent1"/>
     </dgm:fillClrLst>
     <dgm:linClrLst meth="repeat">
       <a:schemeClr val="lt1"/>
@@ -220,8 +197,8 @@
     <dgm:txEffectClrLst/>
   </dgm:styleLbl>
   <dgm:styleLbl name="node3">
-    <dgm:fillClrLst>
-      <a:schemeClr val="accent3"/>
+    <dgm:fillClrLst meth="repeat">
+      <a:schemeClr val="accent1"/>
     </dgm:fillClrLst>
     <dgm:linClrLst meth="repeat">
       <a:schemeClr val="lt1"/>
@@ -232,8 +209,8 @@
     <dgm:txEffectClrLst/>
   </dgm:styleLbl>
   <dgm:styleLbl name="node4">
-    <dgm:fillClrLst>
-      <a:schemeClr val="accent4"/>
+    <dgm:fillClrLst meth="repeat">
+      <a:schemeClr val="accent1"/>
     </dgm:fillClrLst>
     <dgm:linClrLst meth="repeat">
       <a:schemeClr val="lt1"/>
@@ -245,19 +222,7 @@
   </dgm:styleLbl>
   <dgm:styleLbl name="fgImgPlace1">
     <dgm:fillClrLst meth="repeat">
-      <a:schemeClr val="accent2">
-        <a:tint val="50000"/>
-      </a:schemeClr>
-      <a:schemeClr val="accent3">
-        <a:tint val="50000"/>
-      </a:schemeClr>
-      <a:schemeClr val="accent4">
-        <a:tint val="50000"/>
-      </a:schemeClr>
-      <a:schemeClr val="accent5">
-        <a:tint val="50000"/>
-      </a:schemeClr>
-      <a:schemeClr val="accent6">
+      <a:schemeClr val="accent1">
         <a:tint val="50000"/>
       </a:schemeClr>
     </dgm:fillClrLst>
@@ -272,12 +237,9 @@
     <dgm:txEffectClrLst/>
   </dgm:styleLbl>
   <dgm:styleLbl name="alignImgPlace1">
-    <dgm:fillClrLst>
+    <dgm:fillClrLst meth="repeat">
       <a:schemeClr val="accent1">
         <a:tint val="50000"/>
-      </a:schemeClr>
-      <a:schemeClr val="accent2">
-        <a:tint val="20000"/>
       </a:schemeClr>
     </dgm:fillClrLst>
     <dgm:linClrLst meth="repeat">
@@ -291,12 +253,9 @@
     <dgm:txEffectClrLst/>
   </dgm:styleLbl>
   <dgm:styleLbl name="bgImgPlace1">
-    <dgm:fillClrLst>
+    <dgm:fillClrLst meth="repeat">
       <a:schemeClr val="accent1">
         <a:tint val="50000"/>
-      </a:schemeClr>
-      <a:schemeClr val="accent2">
-        <a:tint val="20000"/>
       </a:schemeClr>
     </dgm:fillClrLst>
     <dgm:linClrLst meth="repeat">
@@ -311,14 +270,14 @@
   </dgm:styleLbl>
   <dgm:styleLbl name="sibTrans2D1">
     <dgm:fillClrLst meth="repeat">
-      <a:schemeClr val="accent2"/>
-      <a:schemeClr val="accent3"/>
-      <a:schemeClr val="accent4"/>
-      <a:schemeClr val="accent5"/>
-      <a:schemeClr val="accent6"/>
+      <a:schemeClr val="accent1">
+        <a:tint val="60000"/>
+      </a:schemeClr>
     </dgm:fillClrLst>
-    <dgm:linClrLst meth="cycle">
-      <a:schemeClr val="lt1"/>
+    <dgm:linClrLst meth="repeat">
+      <a:schemeClr val="accent1">
+        <a:tint val="60000"/>
+      </a:schemeClr>
     </dgm:linClrLst>
     <dgm:effectClrLst/>
     <dgm:txLinClrLst/>
@@ -327,54 +286,42 @@
   </dgm:styleLbl>
   <dgm:styleLbl name="fgSibTrans2D1">
     <dgm:fillClrLst meth="repeat">
-      <a:schemeClr val="accent2"/>
-      <a:schemeClr val="accent3"/>
-      <a:schemeClr val="accent4"/>
-      <a:schemeClr val="accent5"/>
-      <a:schemeClr val="accent6"/>
+      <a:schemeClr val="accent1">
+        <a:tint val="60000"/>
+      </a:schemeClr>
     </dgm:fillClrLst>
-    <dgm:linClrLst meth="cycle">
-      <a:schemeClr val="lt1"/>
+    <dgm:linClrLst meth="repeat">
+      <a:schemeClr val="accent1">
+        <a:tint val="60000"/>
+      </a:schemeClr>
     </dgm:linClrLst>
     <dgm:effectClrLst/>
     <dgm:txLinClrLst/>
-    <dgm:txFillClrLst meth="repeat">
-      <a:schemeClr val="lt1"/>
-    </dgm:txFillClrLst>
+    <dgm:txFillClrLst/>
     <dgm:txEffectClrLst/>
   </dgm:styleLbl>
   <dgm:styleLbl name="bgSibTrans2D1">
     <dgm:fillClrLst meth="repeat">
-      <a:schemeClr val="accent2"/>
-      <a:schemeClr val="accent3"/>
-      <a:schemeClr val="accent4"/>
-      <a:schemeClr val="accent5"/>
-      <a:schemeClr val="accent6"/>
+      <a:schemeClr val="accent1">
+        <a:tint val="60000"/>
+      </a:schemeClr>
     </dgm:fillClrLst>
-    <dgm:linClrLst meth="cycle">
-      <a:schemeClr val="lt1"/>
+    <dgm:linClrLst meth="repeat">
+      <a:schemeClr val="accent1">
+        <a:tint val="60000"/>
+      </a:schemeClr>
     </dgm:linClrLst>
     <dgm:effectClrLst/>
     <dgm:txLinClrLst/>
-    <dgm:txFillClrLst meth="repeat">
-      <a:schemeClr val="lt1"/>
-    </dgm:txFillClrLst>
+    <dgm:txFillClrLst/>
     <dgm:txEffectClrLst/>
   </dgm:styleLbl>
   <dgm:styleLbl name="sibTrans1D1">
     <dgm:fillClrLst meth="repeat">
-      <a:schemeClr val="accent2"/>
-      <a:schemeClr val="accent3"/>
-      <a:schemeClr val="accent4"/>
-      <a:schemeClr val="accent5"/>
-      <a:schemeClr val="accent6"/>
+      <a:schemeClr val="accent1"/>
     </dgm:fillClrLst>
     <dgm:linClrLst meth="repeat">
-      <a:schemeClr val="accent2"/>
-      <a:schemeClr val="accent3"/>
-      <a:schemeClr val="accent4"/>
-      <a:schemeClr val="accent5"/>
-      <a:schemeClr val="accent6"/>
+      <a:schemeClr val="accent1"/>
     </dgm:linClrLst>
     <dgm:effectClrLst/>
     <dgm:txLinClrLst/>
@@ -385,10 +332,10 @@
   </dgm:styleLbl>
   <dgm:styleLbl name="callout">
     <dgm:fillClrLst meth="repeat">
-      <a:schemeClr val="accent2"/>
+      <a:schemeClr val="accent1"/>
     </dgm:fillClrLst>
     <dgm:linClrLst meth="repeat">
-      <a:schemeClr val="accent2">
+      <a:schemeClr val="accent1">
         <a:tint val="50000"/>
       </a:schemeClr>
     </dgm:linClrLst>
@@ -413,7 +360,7 @@
   </dgm:styleLbl>
   <dgm:styleLbl name="asst1">
     <dgm:fillClrLst meth="repeat">
-      <a:schemeClr val="accent2"/>
+      <a:schemeClr val="accent1"/>
     </dgm:fillClrLst>
     <dgm:linClrLst meth="repeat">
       <a:schemeClr val="lt1"/>
@@ -424,8 +371,8 @@
     <dgm:txEffectClrLst/>
   </dgm:styleLbl>
   <dgm:styleLbl name="asst2">
-    <dgm:fillClrLst>
-      <a:schemeClr val="accent3"/>
+    <dgm:fillClrLst meth="repeat">
+      <a:schemeClr val="accent1"/>
     </dgm:fillClrLst>
     <dgm:linClrLst meth="repeat">
       <a:schemeClr val="lt1"/>
@@ -436,8 +383,8 @@
     <dgm:txEffectClrLst/>
   </dgm:styleLbl>
   <dgm:styleLbl name="asst3">
-    <dgm:fillClrLst>
-      <a:schemeClr val="accent4"/>
+    <dgm:fillClrLst meth="repeat">
+      <a:schemeClr val="accent1"/>
     </dgm:fillClrLst>
     <dgm:linClrLst meth="repeat">
       <a:schemeClr val="lt1"/>
@@ -448,8 +395,8 @@
     <dgm:txEffectClrLst/>
   </dgm:styleLbl>
   <dgm:styleLbl name="asst4">
-    <dgm:fillClrLst>
-      <a:schemeClr val="accent5"/>
+    <dgm:fillClrLst meth="repeat">
+      <a:schemeClr val="accent1"/>
     </dgm:fillClrLst>
     <dgm:linClrLst meth="repeat">
       <a:schemeClr val="lt1"/>
@@ -461,10 +408,14 @@
   </dgm:styleLbl>
   <dgm:styleLbl name="parChTrans2D1">
     <dgm:fillClrLst meth="repeat">
-      <a:schemeClr val="accent2"/>
+      <a:schemeClr val="accent1">
+        <a:tint val="60000"/>
+      </a:schemeClr>
     </dgm:fillClrLst>
     <dgm:linClrLst meth="repeat">
-      <a:schemeClr val="lt1"/>
+      <a:schemeClr val="accent1">
+        <a:tint val="60000"/>
+      </a:schemeClr>
     </dgm:linClrLst>
     <dgm:effectClrLst/>
     <dgm:txLinClrLst/>
@@ -475,34 +426,38 @@
   </dgm:styleLbl>
   <dgm:styleLbl name="parChTrans2D2">
     <dgm:fillClrLst meth="repeat">
-      <a:schemeClr val="accent3"/>
+      <a:schemeClr val="accent1"/>
     </dgm:fillClrLst>
     <dgm:linClrLst meth="repeat">
-      <a:schemeClr val="lt1"/>
+      <a:schemeClr val="accent1"/>
     </dgm:linClrLst>
     <dgm:effectClrLst/>
     <dgm:txLinClrLst/>
-    <dgm:txFillClrLst/>
+    <dgm:txFillClrLst meth="repeat">
+      <a:schemeClr val="lt1"/>
+    </dgm:txFillClrLst>
     <dgm:txEffectClrLst/>
   </dgm:styleLbl>
   <dgm:styleLbl name="parChTrans2D3">
     <dgm:fillClrLst meth="repeat">
-      <a:schemeClr val="accent4"/>
+      <a:schemeClr val="accent1"/>
     </dgm:fillClrLst>
     <dgm:linClrLst meth="repeat">
-      <a:schemeClr val="lt1"/>
+      <a:schemeClr val="accent1"/>
     </dgm:linClrLst>
     <dgm:effectClrLst/>
     <dgm:txLinClrLst/>
-    <dgm:txFillClrLst/>
+    <dgm:txFillClrLst meth="repeat">
+      <a:schemeClr val="lt1"/>
+    </dgm:txFillClrLst>
     <dgm:txEffectClrLst/>
   </dgm:styleLbl>
   <dgm:styleLbl name="parChTrans2D4">
     <dgm:fillClrLst meth="repeat">
-      <a:schemeClr val="accent5"/>
+      <a:schemeClr val="accent1"/>
     </dgm:fillClrLst>
     <dgm:linClrLst meth="repeat">
-      <a:schemeClr val="lt1"/>
+      <a:schemeClr val="accent1"/>
     </dgm:linClrLst>
     <dgm:effectClrLst/>
     <dgm:txLinClrLst/>
@@ -513,10 +468,12 @@
   </dgm:styleLbl>
   <dgm:styleLbl name="parChTrans1D1">
     <dgm:fillClrLst meth="repeat">
-      <a:schemeClr val="accent2"/>
+      <a:schemeClr val="accent1"/>
     </dgm:fillClrLst>
     <dgm:linClrLst meth="repeat">
-      <a:schemeClr val="accent1"/>
+      <a:schemeClr val="accent1">
+        <a:shade val="60000"/>
+      </a:schemeClr>
     </dgm:linClrLst>
     <dgm:effectClrLst/>
     <dgm:txLinClrLst/>
@@ -527,12 +484,12 @@
   </dgm:styleLbl>
   <dgm:styleLbl name="parChTrans1D2">
     <dgm:fillClrLst meth="repeat">
-      <a:schemeClr val="accent3">
-        <a:tint val="90000"/>
-      </a:schemeClr>
+      <a:schemeClr val="accent1"/>
     </dgm:fillClrLst>
     <dgm:linClrLst meth="repeat">
-      <a:schemeClr val="accent2"/>
+      <a:schemeClr val="accent1">
+        <a:shade val="60000"/>
+      </a:schemeClr>
     </dgm:linClrLst>
     <dgm:effectClrLst/>
     <dgm:txLinClrLst/>
@@ -543,12 +500,12 @@
   </dgm:styleLbl>
   <dgm:styleLbl name="parChTrans1D3">
     <dgm:fillClrLst meth="repeat">
-      <a:schemeClr val="accent4">
-        <a:tint val="70000"/>
-      </a:schemeClr>
+      <a:schemeClr val="accent1"/>
     </dgm:fillClrLst>
     <dgm:linClrLst meth="repeat">
-      <a:schemeClr val="accent3"/>
+      <a:schemeClr val="accent1">
+        <a:shade val="80000"/>
+      </a:schemeClr>
     </dgm:linClrLst>
     <dgm:effectClrLst/>
     <dgm:txLinClrLst/>
@@ -559,12 +516,12 @@
   </dgm:styleLbl>
   <dgm:styleLbl name="parChTrans1D4">
     <dgm:fillClrLst meth="repeat">
-      <a:schemeClr val="accent5">
-        <a:tint val="50000"/>
-      </a:schemeClr>
+      <a:schemeClr val="accent1"/>
     </dgm:fillClrLst>
     <dgm:linClrLst meth="repeat">
-      <a:schemeClr val="accent4"/>
+      <a:schemeClr val="accent1">
+        <a:shade val="80000"/>
+      </a:schemeClr>
     </dgm:linClrLst>
     <dgm:effectClrLst/>
     <dgm:txLinClrLst/>
@@ -580,11 +537,7 @@
       </a:schemeClr>
     </dgm:fillClrLst>
     <dgm:linClrLst meth="repeat">
-      <a:schemeClr val="accent2"/>
-      <a:schemeClr val="accent3"/>
-      <a:schemeClr val="accent4"/>
-      <a:schemeClr val="accent5"/>
-      <a:schemeClr val="accent6"/>
+      <a:schemeClr val="accent1"/>
     </dgm:linClrLst>
     <dgm:effectClrLst/>
     <dgm:txLinClrLst/>
@@ -600,11 +553,7 @@
       </a:schemeClr>
     </dgm:fillClrLst>
     <dgm:linClrLst meth="repeat">
-      <a:schemeClr val="accent2"/>
-      <a:schemeClr val="accent3"/>
-      <a:schemeClr val="accent4"/>
-      <a:schemeClr val="accent5"/>
-      <a:schemeClr val="accent6"/>
+      <a:schemeClr val="accent1"/>
     </dgm:linClrLst>
     <dgm:effectClrLst/>
     <dgm:txLinClrLst/>
@@ -620,11 +569,7 @@
       </a:schemeClr>
     </dgm:fillClrLst>
     <dgm:linClrLst meth="repeat">
-      <a:schemeClr val="accent2"/>
-      <a:schemeClr val="accent3"/>
-      <a:schemeClr val="accent4"/>
-      <a:schemeClr val="accent5"/>
-      <a:schemeClr val="accent6"/>
+      <a:schemeClr val="accent1"/>
     </dgm:linClrLst>
     <dgm:effectClrLst/>
     <dgm:txLinClrLst/>
@@ -656,11 +601,7 @@
       </a:schemeClr>
     </dgm:fillClrLst>
     <dgm:linClrLst meth="repeat">
-      <a:schemeClr val="accent2"/>
-      <a:schemeClr val="accent3"/>
-      <a:schemeClr val="accent4"/>
-      <a:schemeClr val="accent5"/>
-      <a:schemeClr val="accent6"/>
+      <a:schemeClr val="accent1"/>
     </dgm:linClrLst>
     <dgm:effectClrLst/>
     <dgm:txLinClrLst/>
@@ -674,11 +615,7 @@
       <a:schemeClr val="lt1"/>
     </dgm:fillClrLst>
     <dgm:linClrLst meth="repeat">
-      <a:schemeClr val="accent2"/>
-      <a:schemeClr val="accent3"/>
-      <a:schemeClr val="accent4"/>
-      <a:schemeClr val="accent5"/>
-      <a:schemeClr val="accent6"/>
+      <a:schemeClr val="accent1"/>
     </dgm:linClrLst>
     <dgm:effectClrLst/>
     <dgm:txLinClrLst/>
@@ -692,11 +629,7 @@
       <a:schemeClr val="lt1"/>
     </dgm:fillClrLst>
     <dgm:linClrLst meth="repeat">
-      <a:schemeClr val="accent2"/>
-      <a:schemeClr val="accent3"/>
-      <a:schemeClr val="accent4"/>
-      <a:schemeClr val="accent5"/>
-      <a:schemeClr val="accent6"/>
+      <a:schemeClr val="accent1"/>
     </dgm:linClrLst>
     <dgm:effectClrLst/>
     <dgm:txLinClrLst/>
@@ -710,11 +643,7 @@
       <a:schemeClr val="lt1"/>
     </dgm:fillClrLst>
     <dgm:linClrLst meth="repeat">
-      <a:schemeClr val="accent2"/>
-      <a:schemeClr val="accent3"/>
-      <a:schemeClr val="accent4"/>
-      <a:schemeClr val="accent5"/>
-      <a:schemeClr val="accent6"/>
+      <a:schemeClr val="accent1"/>
     </dgm:linClrLst>
     <dgm:effectClrLst/>
     <dgm:txLinClrLst/>
@@ -725,47 +654,15 @@
   </dgm:styleLbl>
   <dgm:styleLbl name="fgAccFollowNode1">
     <dgm:fillClrLst meth="repeat">
-      <a:schemeClr val="accent2">
+      <a:schemeClr val="accent1">
+        <a:alpha val="90000"/>
         <a:tint val="40000"/>
-        <a:alpha val="90000"/>
-      </a:schemeClr>
-      <a:schemeClr val="accent3">
-        <a:tint val="40000"/>
-        <a:alpha val="90000"/>
-      </a:schemeClr>
-      <a:schemeClr val="accent4">
-        <a:tint val="40000"/>
-        <a:alpha val="90000"/>
-      </a:schemeClr>
-      <a:schemeClr val="accent5">
-        <a:tint val="40000"/>
-        <a:alpha val="90000"/>
-      </a:schemeClr>
-      <a:schemeClr val="accent6">
-        <a:tint val="40000"/>
-        <a:alpha val="90000"/>
       </a:schemeClr>
     </dgm:fillClrLst>
     <dgm:linClrLst meth="repeat">
-      <a:schemeClr val="accent2">
+      <a:schemeClr val="accent1">
+        <a:alpha val="90000"/>
         <a:tint val="40000"/>
-        <a:alpha val="90000"/>
-      </a:schemeClr>
-      <a:schemeClr val="accent3">
-        <a:tint val="40000"/>
-        <a:alpha val="90000"/>
-      </a:schemeClr>
-      <a:schemeClr val="accent4">
-        <a:tint val="40000"/>
-        <a:alpha val="90000"/>
-      </a:schemeClr>
-      <a:schemeClr val="accent5">
-        <a:tint val="40000"/>
-        <a:alpha val="90000"/>
-      </a:schemeClr>
-      <a:schemeClr val="accent6">
-        <a:tint val="40000"/>
-        <a:alpha val="90000"/>
       </a:schemeClr>
     </dgm:linClrLst>
     <dgm:effectClrLst/>
@@ -777,47 +674,15 @@
   </dgm:styleLbl>
   <dgm:styleLbl name="alignAccFollowNode1">
     <dgm:fillClrLst meth="repeat">
-      <a:schemeClr val="accent2">
+      <a:schemeClr val="accent1">
+        <a:alpha val="90000"/>
         <a:tint val="40000"/>
-        <a:alpha val="90000"/>
-      </a:schemeClr>
-      <a:schemeClr val="accent3">
-        <a:tint val="40000"/>
-        <a:alpha val="90000"/>
-      </a:schemeClr>
-      <a:schemeClr val="accent4">
-        <a:tint val="40000"/>
-        <a:alpha val="90000"/>
-      </a:schemeClr>
-      <a:schemeClr val="accent5">
-        <a:tint val="40000"/>
-        <a:alpha val="90000"/>
-      </a:schemeClr>
-      <a:schemeClr val="accent6">
-        <a:tint val="40000"/>
-        <a:alpha val="90000"/>
       </a:schemeClr>
     </dgm:fillClrLst>
     <dgm:linClrLst meth="repeat">
-      <a:schemeClr val="accent2">
+      <a:schemeClr val="accent1">
+        <a:alpha val="90000"/>
         <a:tint val="40000"/>
-        <a:alpha val="90000"/>
-      </a:schemeClr>
-      <a:schemeClr val="accent3">
-        <a:tint val="40000"/>
-        <a:alpha val="90000"/>
-      </a:schemeClr>
-      <a:schemeClr val="accent4">
-        <a:tint val="40000"/>
-        <a:alpha val="90000"/>
-      </a:schemeClr>
-      <a:schemeClr val="accent5">
-        <a:tint val="40000"/>
-        <a:alpha val="90000"/>
-      </a:schemeClr>
-      <a:schemeClr val="accent6">
-        <a:tint val="40000"/>
-        <a:alpha val="90000"/>
       </a:schemeClr>
     </dgm:linClrLst>
     <dgm:effectClrLst/>
@@ -829,47 +694,15 @@
   </dgm:styleLbl>
   <dgm:styleLbl name="bgAccFollowNode1">
     <dgm:fillClrLst meth="repeat">
-      <a:schemeClr val="accent2">
+      <a:schemeClr val="accent1">
+        <a:alpha val="90000"/>
         <a:tint val="40000"/>
-        <a:alpha val="90000"/>
-      </a:schemeClr>
-      <a:schemeClr val="accent3">
-        <a:tint val="40000"/>
-        <a:alpha val="90000"/>
-      </a:schemeClr>
-      <a:schemeClr val="accent4">
-        <a:tint val="40000"/>
-        <a:alpha val="90000"/>
-      </a:schemeClr>
-      <a:schemeClr val="accent5">
-        <a:tint val="40000"/>
-        <a:alpha val="90000"/>
-      </a:schemeClr>
-      <a:schemeClr val="accent6">
-        <a:tint val="40000"/>
-        <a:alpha val="90000"/>
       </a:schemeClr>
     </dgm:fillClrLst>
     <dgm:linClrLst meth="repeat">
-      <a:schemeClr val="accent2">
+      <a:schemeClr val="accent1">
+        <a:alpha val="90000"/>
         <a:tint val="40000"/>
-        <a:alpha val="90000"/>
-      </a:schemeClr>
-      <a:schemeClr val="accent3">
-        <a:tint val="40000"/>
-        <a:alpha val="90000"/>
-      </a:schemeClr>
-      <a:schemeClr val="accent4">
-        <a:tint val="40000"/>
-        <a:alpha val="90000"/>
-      </a:schemeClr>
-      <a:schemeClr val="accent5">
-        <a:tint val="40000"/>
-        <a:alpha val="90000"/>
-      </a:schemeClr>
-      <a:schemeClr val="accent6">
-        <a:tint val="40000"/>
-        <a:alpha val="90000"/>
       </a:schemeClr>
     </dgm:linClrLst>
     <dgm:effectClrLst/>
@@ -885,7 +718,7 @@
         <a:alpha val="90000"/>
       </a:schemeClr>
     </dgm:fillClrLst>
-    <dgm:linClrLst>
+    <dgm:linClrLst meth="repeat">
       <a:schemeClr val="accent1"/>
     </dgm:linClrLst>
     <dgm:effectClrLst/>
@@ -901,8 +734,8 @@
         <a:alpha val="90000"/>
       </a:schemeClr>
     </dgm:fillClrLst>
-    <dgm:linClrLst>
-      <a:schemeClr val="accent2"/>
+    <dgm:linClrLst meth="repeat">
+      <a:schemeClr val="accent1"/>
     </dgm:linClrLst>
     <dgm:effectClrLst/>
     <dgm:txLinClrLst/>
@@ -917,8 +750,8 @@
         <a:alpha val="90000"/>
       </a:schemeClr>
     </dgm:fillClrLst>
-    <dgm:linClrLst>
-      <a:schemeClr val="accent3"/>
+    <dgm:linClrLst meth="repeat">
+      <a:schemeClr val="accent1"/>
     </dgm:linClrLst>
     <dgm:effectClrLst/>
     <dgm:txLinClrLst/>
@@ -933,8 +766,8 @@
         <a:alpha val="90000"/>
       </a:schemeClr>
     </dgm:fillClrLst>
-    <dgm:linClrLst>
-      <a:schemeClr val="accent4"/>
+    <dgm:linClrLst meth="repeat">
+      <a:schemeClr val="accent1"/>
     </dgm:linClrLst>
     <dgm:effectClrLst/>
     <dgm:txLinClrLst/>
@@ -945,12 +778,12 @@
   </dgm:styleLbl>
   <dgm:styleLbl name="bgShp">
     <dgm:fillClrLst meth="repeat">
-      <a:schemeClr val="bg1">
-        <a:lumMod val="95000"/>
+      <a:schemeClr val="accent1">
+        <a:tint val="40000"/>
       </a:schemeClr>
     </dgm:fillClrLst>
     <dgm:linClrLst meth="repeat">
-      <a:schemeClr val="dk1"/>
+      <a:schemeClr val="accent1"/>
     </dgm:linClrLst>
     <dgm:effectClrLst/>
     <dgm:txLinClrLst/>
@@ -961,12 +794,12 @@
   </dgm:styleLbl>
   <dgm:styleLbl name="dkBgShp">
     <dgm:fillClrLst meth="repeat">
-      <a:schemeClr val="accent2">
-        <a:shade val="90000"/>
+      <a:schemeClr val="accent1">
+        <a:shade val="80000"/>
       </a:schemeClr>
     </dgm:fillClrLst>
     <dgm:linClrLst meth="repeat">
-      <a:schemeClr val="dk1"/>
+      <a:schemeClr val="accent1"/>
     </dgm:linClrLst>
     <dgm:effectClrLst/>
     <dgm:txLinClrLst/>
@@ -983,7 +816,7 @@
       </a:schemeClr>
     </dgm:fillClrLst>
     <dgm:linClrLst meth="repeat">
-      <a:schemeClr val="accent2"/>
+      <a:schemeClr val="accent1"/>
     </dgm:linClrLst>
     <dgm:effectClrLst/>
     <dgm:txLinClrLst/>
@@ -994,8 +827,8 @@
   </dgm:styleLbl>
   <dgm:styleLbl name="fgShp">
     <dgm:fillClrLst meth="repeat">
-      <a:schemeClr val="accent2">
-        <a:tint val="40000"/>
+      <a:schemeClr val="accent1">
+        <a:tint val="60000"/>
       </a:schemeClr>
     </dgm:fillClrLst>
     <dgm:linClrLst meth="repeat">
@@ -1033,7 +866,7 @@
 <dgm:dataModel xmlns:dgm="http://schemas.openxmlformats.org/drawingml/2006/diagram" xmlns:a="http://schemas.openxmlformats.org/drawingml/2006/main">
   <dgm:ptLst>
     <dgm:pt modelId="{28EB5AD5-A6C2-4B59-9B19-018EF9C90788}" type="doc">
-      <dgm:prSet loTypeId="urn:microsoft.com/office/officeart/2018/2/layout/IconLabelDescriptionList" loCatId="icon" qsTypeId="urn:microsoft.com/office/officeart/2005/8/quickstyle/simple1" qsCatId="simple" csTypeId="urn:microsoft.com/office/officeart/2018/5/colors/Iconchunking_neutralbg_colorful1" csCatId="colorful" phldr="1"/>
+      <dgm:prSet loTypeId="urn:microsoft.com/office/officeart/2018/2/layout/IconLabelDescriptionList" loCatId="icon" qsTypeId="urn:microsoft.com/office/officeart/2005/8/quickstyle/simple1" qsCatId="simple" csTypeId="urn:microsoft.com/office/officeart/2005/8/colors/accent1_2" csCatId="accent1" phldr="1"/>
       <dgm:spPr/>
       <dgm:t>
         <a:bodyPr/>
@@ -1050,12 +883,9 @@
         <a:bodyPr/>
         <a:lstStyle/>
         <a:p>
-          <a:pPr>
-            <a:defRPr b="1"/>
-          </a:pPr>
           <a:r>
-            <a:rPr lang="en-US"/>
-            <a:t>Inline :</a:t>
+            <a:rPr lang="en-US" dirty="0"/>
+            <a:t>Inline </a:t>
           </a:r>
         </a:p>
       </dgm:t>
@@ -1126,9 +956,6 @@
         <a:bodyPr/>
         <a:lstStyle/>
         <a:p>
-          <a:pPr>
-            <a:defRPr b="1"/>
-          </a:pPr>
           <a:r>
             <a:rPr lang="en-IN"/>
             <a:t>Imported</a:t>
@@ -1204,10 +1031,24 @@
         </dgm:presLayoutVars>
       </dgm:prSet>
       <dgm:spPr/>
+      <dgm:t>
+        <a:bodyPr/>
+        <a:lstStyle/>
+        <a:p>
+          <a:endParaRPr lang="en-US"/>
+        </a:p>
+      </dgm:t>
     </dgm:pt>
     <dgm:pt modelId="{615944D4-7002-45E4-8B58-B4C21DD23B77}" type="pres">
       <dgm:prSet presAssocID="{D3CF8F88-0392-43D7-845B-4F0B5B2205D5}" presName="compNode" presStyleCnt="0"/>
       <dgm:spPr/>
+      <dgm:t>
+        <a:bodyPr/>
+        <a:lstStyle/>
+        <a:p>
+          <a:endParaRPr lang="en-US"/>
+        </a:p>
+      </dgm:t>
     </dgm:pt>
     <dgm:pt modelId="{DF4BEA95-CD49-4EE0-A7C5-B71D555DA35C}" type="pres">
       <dgm:prSet presAssocID="{D3CF8F88-0392-43D7-845B-4F0B5B2205D5}" presName="iconRect" presStyleLbl="node1" presStyleIdx="0" presStyleCnt="2"/>
@@ -1219,7 +1060,7 @@
                 <a14:useLocalDpi xmlns:a14="http://schemas.microsoft.com/office/drawing/2010/main" val="0"/>
               </a:ext>
               <a:ext uri="{96DAC541-7B7A-43D3-8B79-37D633B846F1}">
-                <asvg:svgBlip xmlns:asvg="http://schemas.microsoft.com/office/drawing/2016/SVG/main" r:embed="rId2"/>
+                <asvg:svgBlip xmlns:asvg="http://schemas.microsoft.com/office/drawing/2016/SVG/main" xmlns="" r:embed="rId2"/>
               </a:ext>
             </a:extLst>
           </a:blip>
@@ -1227,10 +1068,14 @@
             <a:fillRect/>
           </a:stretch>
         </a:blipFill>
-        <a:ln>
-          <a:noFill/>
-        </a:ln>
       </dgm:spPr>
+      <dgm:t>
+        <a:bodyPr/>
+        <a:lstStyle/>
+        <a:p>
+          <a:endParaRPr lang="en-US"/>
+        </a:p>
+      </dgm:t>
       <dgm:extLst>
         <a:ext uri="{E40237B7-FDA0-4F09-8148-C483321AD2D9}">
           <dgm14:cNvPr xmlns:dgm14="http://schemas.microsoft.com/office/drawing/2010/diagram" id="0" name="" descr="Checkmark"/>
@@ -1240,6 +1085,13 @@
     <dgm:pt modelId="{B57C9D18-0A3B-4AF4-A9BB-FA69701ED54E}" type="pres">
       <dgm:prSet presAssocID="{D3CF8F88-0392-43D7-845B-4F0B5B2205D5}" presName="iconSpace" presStyleCnt="0"/>
       <dgm:spPr/>
+      <dgm:t>
+        <a:bodyPr/>
+        <a:lstStyle/>
+        <a:p>
+          <a:endParaRPr lang="en-US"/>
+        </a:p>
+      </dgm:t>
     </dgm:pt>
     <dgm:pt modelId="{3CE6783F-646E-44BF-9E6B-FFB30E1D79E6}" type="pres">
       <dgm:prSet presAssocID="{D3CF8F88-0392-43D7-845B-4F0B5B2205D5}" presName="parTx" presStyleLbl="revTx" presStyleIdx="0" presStyleCnt="4">
@@ -1249,24 +1101,59 @@
         </dgm:presLayoutVars>
       </dgm:prSet>
       <dgm:spPr/>
+      <dgm:t>
+        <a:bodyPr/>
+        <a:lstStyle/>
+        <a:p>
+          <a:endParaRPr lang="en-US"/>
+        </a:p>
+      </dgm:t>
     </dgm:pt>
     <dgm:pt modelId="{F10E24CD-589B-4115-937D-BED5F622EEE3}" type="pres">
       <dgm:prSet presAssocID="{D3CF8F88-0392-43D7-845B-4F0B5B2205D5}" presName="txSpace" presStyleCnt="0"/>
       <dgm:spPr/>
+      <dgm:t>
+        <a:bodyPr/>
+        <a:lstStyle/>
+        <a:p>
+          <a:endParaRPr lang="en-US"/>
+        </a:p>
+      </dgm:t>
     </dgm:pt>
     <dgm:pt modelId="{6D61C22C-FE21-420E-B87E-B464090AEDD8}" type="pres">
       <dgm:prSet presAssocID="{D3CF8F88-0392-43D7-845B-4F0B5B2205D5}" presName="desTx" presStyleLbl="revTx" presStyleIdx="1" presStyleCnt="4">
         <dgm:presLayoutVars/>
       </dgm:prSet>
       <dgm:spPr/>
+      <dgm:t>
+        <a:bodyPr/>
+        <a:lstStyle/>
+        <a:p>
+          <a:endParaRPr lang="en-US"/>
+        </a:p>
+      </dgm:t>
     </dgm:pt>
     <dgm:pt modelId="{C0CF4267-641C-4EDF-BB21-A138406772C9}" type="pres">
       <dgm:prSet presAssocID="{A444E42D-AE8F-4D9C-B2B4-86A2CADA8FC3}" presName="sibTrans" presStyleCnt="0"/>
       <dgm:spPr/>
+      <dgm:t>
+        <a:bodyPr/>
+        <a:lstStyle/>
+        <a:p>
+          <a:endParaRPr lang="en-US"/>
+        </a:p>
+      </dgm:t>
     </dgm:pt>
     <dgm:pt modelId="{3D491B71-38C5-4B0F-833E-A3ED84838CC6}" type="pres">
       <dgm:prSet presAssocID="{8604446F-BA62-4580-8DFD-360B63D11575}" presName="compNode" presStyleCnt="0"/>
       <dgm:spPr/>
+      <dgm:t>
+        <a:bodyPr/>
+        <a:lstStyle/>
+        <a:p>
+          <a:endParaRPr lang="en-US"/>
+        </a:p>
+      </dgm:t>
     </dgm:pt>
     <dgm:pt modelId="{722AFA75-756E-4907-99E6-8A900BBD6855}" type="pres">
       <dgm:prSet presAssocID="{8604446F-BA62-4580-8DFD-360B63D11575}" presName="iconRect" presStyleLbl="node1" presStyleIdx="1" presStyleCnt="2"/>
@@ -1278,7 +1165,7 @@
                 <a14:useLocalDpi xmlns:a14="http://schemas.microsoft.com/office/drawing/2010/main" val="0"/>
               </a:ext>
               <a:ext uri="{96DAC541-7B7A-43D3-8B79-37D633B846F1}">
-                <asvg:svgBlip xmlns:asvg="http://schemas.microsoft.com/office/drawing/2016/SVG/main" r:embed="rId4"/>
+                <asvg:svgBlip xmlns:asvg="http://schemas.microsoft.com/office/drawing/2016/SVG/main" xmlns="" r:embed="rId4"/>
               </a:ext>
             </a:extLst>
           </a:blip>
@@ -1286,10 +1173,14 @@
             <a:fillRect/>
           </a:stretch>
         </a:blipFill>
-        <a:ln>
-          <a:noFill/>
-        </a:ln>
       </dgm:spPr>
+      <dgm:t>
+        <a:bodyPr/>
+        <a:lstStyle/>
+        <a:p>
+          <a:endParaRPr lang="en-US"/>
+        </a:p>
+      </dgm:t>
       <dgm:extLst>
         <a:ext uri="{E40237B7-FDA0-4F09-8148-C483321AD2D9}">
           <dgm14:cNvPr xmlns:dgm14="http://schemas.microsoft.com/office/drawing/2010/diagram" id="0" name="" descr="Database"/>
@@ -1299,6 +1190,13 @@
     <dgm:pt modelId="{E4E1A8B2-BA3B-45C3-A76C-53FE6F6ECC4B}" type="pres">
       <dgm:prSet presAssocID="{8604446F-BA62-4580-8DFD-360B63D11575}" presName="iconSpace" presStyleCnt="0"/>
       <dgm:spPr/>
+      <dgm:t>
+        <a:bodyPr/>
+        <a:lstStyle/>
+        <a:p>
+          <a:endParaRPr lang="en-US"/>
+        </a:p>
+      </dgm:t>
     </dgm:pt>
     <dgm:pt modelId="{8ED452B6-2848-437F-9B61-09961A2F01EC}" type="pres">
       <dgm:prSet presAssocID="{8604446F-BA62-4580-8DFD-360B63D11575}" presName="parTx" presStyleLbl="revTx" presStyleIdx="2" presStyleCnt="4">
@@ -1308,28 +1206,49 @@
         </dgm:presLayoutVars>
       </dgm:prSet>
       <dgm:spPr/>
+      <dgm:t>
+        <a:bodyPr/>
+        <a:lstStyle/>
+        <a:p>
+          <a:endParaRPr lang="en-US"/>
+        </a:p>
+      </dgm:t>
     </dgm:pt>
     <dgm:pt modelId="{B5B4AD28-4E00-4387-9E4A-FD697FDBACEB}" type="pres">
       <dgm:prSet presAssocID="{8604446F-BA62-4580-8DFD-360B63D11575}" presName="txSpace" presStyleCnt="0"/>
       <dgm:spPr/>
+      <dgm:t>
+        <a:bodyPr/>
+        <a:lstStyle/>
+        <a:p>
+          <a:endParaRPr lang="en-US"/>
+        </a:p>
+      </dgm:t>
     </dgm:pt>
     <dgm:pt modelId="{FD7B3109-24CA-45C1-A05F-C77E8F77C2D7}" type="pres">
       <dgm:prSet presAssocID="{8604446F-BA62-4580-8DFD-360B63D11575}" presName="desTx" presStyleLbl="revTx" presStyleIdx="3" presStyleCnt="4">
         <dgm:presLayoutVars/>
       </dgm:prSet>
       <dgm:spPr/>
+      <dgm:t>
+        <a:bodyPr/>
+        <a:lstStyle/>
+        <a:p>
+          <a:endParaRPr lang="en-US"/>
+        </a:p>
+      </dgm:t>
     </dgm:pt>
   </dgm:ptLst>
   <dgm:cxnLst>
+    <dgm:cxn modelId="{A2C3BE7C-0A5E-42EB-A7CE-7A7F4486C897}" type="presOf" srcId="{B2297C07-1EC0-406F-B230-0E5DD7F0E4D4}" destId="{FD7B3109-24CA-45C1-A05F-C77E8F77C2D7}" srcOrd="0" destOrd="0" presId="urn:microsoft.com/office/officeart/2018/2/layout/IconLabelDescriptionList"/>
+    <dgm:cxn modelId="{9A53CDCA-C1D3-48F0-A647-4D75AA2606DF}" type="presOf" srcId="{8604446F-BA62-4580-8DFD-360B63D11575}" destId="{8ED452B6-2848-437F-9B61-09961A2F01EC}" srcOrd="0" destOrd="0" presId="urn:microsoft.com/office/officeart/2018/2/layout/IconLabelDescriptionList"/>
+    <dgm:cxn modelId="{7097756E-B653-4F02-A2D3-08FBB16D60C3}" srcId="{28EB5AD5-A6C2-4B59-9B19-018EF9C90788}" destId="{D3CF8F88-0392-43D7-845B-4F0B5B2205D5}" srcOrd="0" destOrd="0" parTransId="{F8E8CDBB-B297-4A92-9BE5-8979D4D3331B}" sibTransId="{A444E42D-AE8F-4D9C-B2B4-86A2CADA8FC3}"/>
+    <dgm:cxn modelId="{ACD5D28E-D251-4B2A-B09B-77228A66F3A8}" srcId="{D3CF8F88-0392-43D7-845B-4F0B5B2205D5}" destId="{1CAEFB7B-EA4E-42BB-93D2-CF1D51322A03}" srcOrd="0" destOrd="0" parTransId="{B2B2BA3F-F937-400E-BF53-AAE5EF79A3F2}" sibTransId="{60A251E7-2F31-4635-8F61-29821DEBED39}"/>
+    <dgm:cxn modelId="{49DD3A34-3514-4F80-B903-C81AA726038B}" srcId="{8604446F-BA62-4580-8DFD-360B63D11575}" destId="{B2297C07-1EC0-406F-B230-0E5DD7F0E4D4}" srcOrd="0" destOrd="0" parTransId="{83377716-FAD0-4C7E-A8EE-A8B3D3B42580}" sibTransId="{D7DEC76D-81A7-472B-874B-0EF49411BF5B}"/>
+    <dgm:cxn modelId="{7AF4E7BD-C02F-4C78-9037-1A6BF4955716}" srcId="{28EB5AD5-A6C2-4B59-9B19-018EF9C90788}" destId="{8604446F-BA62-4580-8DFD-360B63D11575}" srcOrd="1" destOrd="0" parTransId="{D773142A-38A6-46E1-863E-BF5551C3C1F2}" sibTransId="{BC08C1AF-83FA-4E72-9C17-9B0B7F733A14}"/>
+    <dgm:cxn modelId="{72BD1C71-DCB1-4717-8FB6-F816846D9D9A}" type="presOf" srcId="{28EB5AD5-A6C2-4B59-9B19-018EF9C90788}" destId="{8011F89C-F3BA-423B-9512-EFFA6DDFF411}" srcOrd="0" destOrd="0" presId="urn:microsoft.com/office/officeart/2018/2/layout/IconLabelDescriptionList"/>
+    <dgm:cxn modelId="{2FF481A4-926F-4B99-A867-5C938FB6EDDB}" type="presOf" srcId="{D3CF8F88-0392-43D7-845B-4F0B5B2205D5}" destId="{3CE6783F-646E-44BF-9E6B-FFB30E1D79E6}" srcOrd="0" destOrd="0" presId="urn:microsoft.com/office/officeart/2018/2/layout/IconLabelDescriptionList"/>
     <dgm:cxn modelId="{7ABB3A2A-8113-4F63-817E-D4786E293DDD}" type="presOf" srcId="{1CAEFB7B-EA4E-42BB-93D2-CF1D51322A03}" destId="{6D61C22C-FE21-420E-B87E-B464090AEDD8}" srcOrd="0" destOrd="0" presId="urn:microsoft.com/office/officeart/2018/2/layout/IconLabelDescriptionList"/>
-    <dgm:cxn modelId="{49DD3A34-3514-4F80-B903-C81AA726038B}" srcId="{8604446F-BA62-4580-8DFD-360B63D11575}" destId="{B2297C07-1EC0-406F-B230-0E5DD7F0E4D4}" srcOrd="0" destOrd="0" parTransId="{83377716-FAD0-4C7E-A8EE-A8B3D3B42580}" sibTransId="{D7DEC76D-81A7-472B-874B-0EF49411BF5B}"/>
-    <dgm:cxn modelId="{7097756E-B653-4F02-A2D3-08FBB16D60C3}" srcId="{28EB5AD5-A6C2-4B59-9B19-018EF9C90788}" destId="{D3CF8F88-0392-43D7-845B-4F0B5B2205D5}" srcOrd="0" destOrd="0" parTransId="{F8E8CDBB-B297-4A92-9BE5-8979D4D3331B}" sibTransId="{A444E42D-AE8F-4D9C-B2B4-86A2CADA8FC3}"/>
-    <dgm:cxn modelId="{72BD1C71-DCB1-4717-8FB6-F816846D9D9A}" type="presOf" srcId="{28EB5AD5-A6C2-4B59-9B19-018EF9C90788}" destId="{8011F89C-F3BA-423B-9512-EFFA6DDFF411}" srcOrd="0" destOrd="0" presId="urn:microsoft.com/office/officeart/2018/2/layout/IconLabelDescriptionList"/>
-    <dgm:cxn modelId="{A2C3BE7C-0A5E-42EB-A7CE-7A7F4486C897}" type="presOf" srcId="{B2297C07-1EC0-406F-B230-0E5DD7F0E4D4}" destId="{FD7B3109-24CA-45C1-A05F-C77E8F77C2D7}" srcOrd="0" destOrd="0" presId="urn:microsoft.com/office/officeart/2018/2/layout/IconLabelDescriptionList"/>
-    <dgm:cxn modelId="{ACD5D28E-D251-4B2A-B09B-77228A66F3A8}" srcId="{D3CF8F88-0392-43D7-845B-4F0B5B2205D5}" destId="{1CAEFB7B-EA4E-42BB-93D2-CF1D51322A03}" srcOrd="0" destOrd="0" parTransId="{B2B2BA3F-F937-400E-BF53-AAE5EF79A3F2}" sibTransId="{60A251E7-2F31-4635-8F61-29821DEBED39}"/>
-    <dgm:cxn modelId="{2FF481A4-926F-4B99-A867-5C938FB6EDDB}" type="presOf" srcId="{D3CF8F88-0392-43D7-845B-4F0B5B2205D5}" destId="{3CE6783F-646E-44BF-9E6B-FFB30E1D79E6}" srcOrd="0" destOrd="0" presId="urn:microsoft.com/office/officeart/2018/2/layout/IconLabelDescriptionList"/>
-    <dgm:cxn modelId="{7AF4E7BD-C02F-4C78-9037-1A6BF4955716}" srcId="{28EB5AD5-A6C2-4B59-9B19-018EF9C90788}" destId="{8604446F-BA62-4580-8DFD-360B63D11575}" srcOrd="1" destOrd="0" parTransId="{D773142A-38A6-46E1-863E-BF5551C3C1F2}" sibTransId="{BC08C1AF-83FA-4E72-9C17-9B0B7F733A14}"/>
-    <dgm:cxn modelId="{9A53CDCA-C1D3-48F0-A647-4D75AA2606DF}" type="presOf" srcId="{8604446F-BA62-4580-8DFD-360B63D11575}" destId="{8ED452B6-2848-437F-9B61-09961A2F01EC}" srcOrd="0" destOrd="0" presId="urn:microsoft.com/office/officeart/2018/2/layout/IconLabelDescriptionList"/>
     <dgm:cxn modelId="{669AE8A3-5941-4807-87A5-B8BBE7883D56}" type="presParOf" srcId="{8011F89C-F3BA-423B-9512-EFFA6DDFF411}" destId="{615944D4-7002-45E4-8B58-B4C21DD23B77}" srcOrd="0" destOrd="0" presId="urn:microsoft.com/office/officeart/2018/2/layout/IconLabelDescriptionList"/>
     <dgm:cxn modelId="{B0B7FA6E-DDC9-4A52-8951-30A830118B68}" type="presParOf" srcId="{615944D4-7002-45E4-8B58-B4C21DD23B77}" destId="{DF4BEA95-CD49-4EE0-A7C5-B71D555DA35C}" srcOrd="0" destOrd="0" presId="urn:microsoft.com/office/officeart/2018/2/layout/IconLabelDescriptionList"/>
     <dgm:cxn modelId="{8673EF4D-B947-4449-BC58-A56F68ECC9B5}" type="presParOf" srcId="{615944D4-7002-45E4-8B58-B4C21DD23B77}" destId="{B57C9D18-0A3B-4AF4-A9BB-FA69701ED54E}" srcOrd="1" destOrd="0" presId="urn:microsoft.com/office/officeart/2018/2/layout/IconLabelDescriptionList"/>
@@ -1382,7 +1301,7 @@
                 <a14:useLocalDpi xmlns:a14="http://schemas.microsoft.com/office/drawing/2010/main" val="0"/>
               </a:ext>
               <a:ext uri="{96DAC541-7B7A-43D3-8B79-37D633B846F1}">
-                <asvg:svgBlip xmlns:asvg="http://schemas.microsoft.com/office/drawing/2016/SVG/main" r:embed="rId2"/>
+                <asvg:svgBlip xmlns:asvg="http://schemas.microsoft.com/office/drawing/2016/SVG/main" xmlns="" r:embed="rId2"/>
               </a:ext>
             </a:extLst>
           </a:blip>
@@ -1391,7 +1310,14 @@
           </a:stretch>
         </a:blipFill>
         <a:ln w="19050" cap="rnd" cmpd="sng" algn="ctr">
-          <a:noFill/>
+          <a:solidFill>
+            <a:schemeClr val="lt1">
+              <a:hueOff val="0"/>
+              <a:satOff val="0"/>
+              <a:lumOff val="0"/>
+              <a:alphaOff val="0"/>
+            </a:schemeClr>
+          </a:solidFill>
           <a:prstDash val="solid"/>
         </a:ln>
         <a:effectLst/>
@@ -1448,7 +1374,7 @@
         </a:bodyPr>
         <a:lstStyle/>
         <a:p>
-          <a:pPr marL="0" lvl="0" indent="0" algn="l" defTabSz="1600200">
+          <a:pPr lvl="0" algn="l" defTabSz="1600200">
             <a:lnSpc>
               <a:spcPct val="90000"/>
             </a:lnSpc>
@@ -1458,12 +1384,10 @@
             <a:spcAft>
               <a:spcPct val="35000"/>
             </a:spcAft>
-            <a:buNone/>
-            <a:defRPr b="1"/>
           </a:pPr>
           <a:r>
-            <a:rPr lang="en-US" sz="3600" kern="1200"/>
-            <a:t>Inline :</a:t>
+            <a:rPr lang="en-US" sz="3600" kern="1200" dirty="0"/>
+            <a:t>Inline </a:t>
           </a:r>
         </a:p>
       </dsp:txBody>
@@ -1509,7 +1433,7 @@
         </a:bodyPr>
         <a:lstStyle/>
         <a:p>
-          <a:pPr marL="0" lvl="0" indent="0" algn="l" defTabSz="755650">
+          <a:pPr lvl="0" algn="l" defTabSz="755650">
             <a:lnSpc>
               <a:spcPct val="90000"/>
             </a:lnSpc>
@@ -1519,7 +1443,6 @@
             <a:spcAft>
               <a:spcPct val="35000"/>
             </a:spcAft>
-            <a:buNone/>
           </a:pPr>
           <a:r>
             <a:rPr lang="en-IN" sz="1700" kern="1200"/>
@@ -1553,7 +1476,7 @@
                 <a14:useLocalDpi xmlns:a14="http://schemas.microsoft.com/office/drawing/2010/main" val="0"/>
               </a:ext>
               <a:ext uri="{96DAC541-7B7A-43D3-8B79-37D633B846F1}">
-                <asvg:svgBlip xmlns:asvg="http://schemas.microsoft.com/office/drawing/2016/SVG/main" r:embed="rId4"/>
+                <asvg:svgBlip xmlns:asvg="http://schemas.microsoft.com/office/drawing/2016/SVG/main" xmlns="" r:embed="rId4"/>
               </a:ext>
             </a:extLst>
           </a:blip>
@@ -1562,7 +1485,14 @@
           </a:stretch>
         </a:blipFill>
         <a:ln w="19050" cap="rnd" cmpd="sng" algn="ctr">
-          <a:noFill/>
+          <a:solidFill>
+            <a:schemeClr val="lt1">
+              <a:hueOff val="0"/>
+              <a:satOff val="0"/>
+              <a:lumOff val="0"/>
+              <a:alphaOff val="0"/>
+            </a:schemeClr>
+          </a:solidFill>
           <a:prstDash val="solid"/>
         </a:ln>
         <a:effectLst/>
@@ -1619,7 +1549,7 @@
         </a:bodyPr>
         <a:lstStyle/>
         <a:p>
-          <a:pPr marL="0" lvl="0" indent="0" algn="l" defTabSz="1600200">
+          <a:pPr lvl="0" algn="l" defTabSz="1600200">
             <a:lnSpc>
               <a:spcPct val="90000"/>
             </a:lnSpc>
@@ -1629,8 +1559,6 @@
             <a:spcAft>
               <a:spcPct val="35000"/>
             </a:spcAft>
-            <a:buNone/>
-            <a:defRPr b="1"/>
           </a:pPr>
           <a:r>
             <a:rPr lang="en-IN" sz="3600" kern="1200"/>
@@ -1681,7 +1609,7 @@
         </a:bodyPr>
         <a:lstStyle/>
         <a:p>
-          <a:pPr marL="0" lvl="0" indent="0" algn="l" defTabSz="755650">
+          <a:pPr lvl="0" algn="l" defTabSz="755650">
             <a:lnSpc>
               <a:spcPct val="90000"/>
             </a:lnSpc>
@@ -1691,7 +1619,6 @@
             <a:spcAft>
               <a:spcPct val="35000"/>
             </a:spcAft>
-            <a:buNone/>
           </a:pPr>
           <a:r>
             <a:rPr lang="en-IN" sz="1700" kern="1200"/>
@@ -1900,7 +1827,7 @@
   </dgm:layoutNode>
   <dgm:extLst>
     <a:ext uri="{68A01E43-0DF5-4B5B-8FA6-DAF915123BFB}">
-      <dgm1612:lstStyle xmlns:dgm1612="http://schemas.microsoft.com/office/drawing/2016/12/diagram">
+      <dgm1612:lstStyle xmlns:dgm1612="http://schemas.microsoft.com/office/drawing/2016/12/diagram" xmlns="">
         <a:lvl1pPr>
           <a:lnSpc>
             <a:spcPct val="100000"/>
@@ -3674,7 +3601,7 @@
           <a:p>
             <a:fld id="{EAE9C118-8551-4CED-89C6-F63B7BEEF840}" type="datetimeFigureOut">
               <a:rPr lang="en-IN" smtClean="0"/>
-              <a:t>04-05-2020</a:t>
+              <a:t>07-05-2020</a:t>
             </a:fld>
             <a:endParaRPr lang="en-IN"/>
           </a:p>
@@ -3925,7 +3852,7 @@
           <a:p>
             <a:fld id="{EAE9C118-8551-4CED-89C6-F63B7BEEF840}" type="datetimeFigureOut">
               <a:rPr lang="en-IN" smtClean="0"/>
-              <a:t>04-05-2020</a:t>
+              <a:t>07-05-2020</a:t>
             </a:fld>
             <a:endParaRPr lang="en-IN"/>
           </a:p>
@@ -4239,7 +4166,7 @@
           <a:p>
             <a:fld id="{EAE9C118-8551-4CED-89C6-F63B7BEEF840}" type="datetimeFigureOut">
               <a:rPr lang="en-IN" smtClean="0"/>
-              <a:t>04-05-2020</a:t>
+              <a:t>07-05-2020</a:t>
             </a:fld>
             <a:endParaRPr lang="en-IN"/>
           </a:p>
@@ -4580,7 +4507,7 @@
           <a:p>
             <a:fld id="{EAE9C118-8551-4CED-89C6-F63B7BEEF840}" type="datetimeFigureOut">
               <a:rPr lang="en-IN" smtClean="0"/>
-              <a:t>04-05-2020</a:t>
+              <a:t>07-05-2020</a:t>
             </a:fld>
             <a:endParaRPr lang="en-IN"/>
           </a:p>
@@ -4894,7 +4821,7 @@
           <a:p>
             <a:fld id="{EAE9C118-8551-4CED-89C6-F63B7BEEF840}" type="datetimeFigureOut">
               <a:rPr lang="en-IN" smtClean="0"/>
-              <a:t>04-05-2020</a:t>
+              <a:t>07-05-2020</a:t>
             </a:fld>
             <a:endParaRPr lang="en-IN"/>
           </a:p>
@@ -5287,7 +5214,7 @@
           <a:p>
             <a:fld id="{EAE9C118-8551-4CED-89C6-F63B7BEEF840}" type="datetimeFigureOut">
               <a:rPr lang="en-IN" smtClean="0"/>
-              <a:t>04-05-2020</a:t>
+              <a:t>07-05-2020</a:t>
             </a:fld>
             <a:endParaRPr lang="en-IN"/>
           </a:p>
@@ -5457,7 +5384,7 @@
           <a:p>
             <a:fld id="{EAE9C118-8551-4CED-89C6-F63B7BEEF840}" type="datetimeFigureOut">
               <a:rPr lang="en-IN" smtClean="0"/>
-              <a:t>04-05-2020</a:t>
+              <a:t>07-05-2020</a:t>
             </a:fld>
             <a:endParaRPr lang="en-IN"/>
           </a:p>
@@ -5637,7 +5564,7 @@
           <a:p>
             <a:fld id="{EAE9C118-8551-4CED-89C6-F63B7BEEF840}" type="datetimeFigureOut">
               <a:rPr lang="en-IN" smtClean="0"/>
-              <a:t>04-05-2020</a:t>
+              <a:t>07-05-2020</a:t>
             </a:fld>
             <a:endParaRPr lang="en-IN"/>
           </a:p>
@@ -5813,7 +5740,7 @@
           <a:p>
             <a:fld id="{EAE9C118-8551-4CED-89C6-F63B7BEEF840}" type="datetimeFigureOut">
               <a:rPr lang="en-IN" smtClean="0"/>
-              <a:t>04-05-2020</a:t>
+              <a:t>07-05-2020</a:t>
             </a:fld>
             <a:endParaRPr lang="en-IN"/>
           </a:p>
@@ -6060,7 +5987,7 @@
           <a:p>
             <a:fld id="{EAE9C118-8551-4CED-89C6-F63B7BEEF840}" type="datetimeFigureOut">
               <a:rPr lang="en-IN" smtClean="0"/>
-              <a:t>04-05-2020</a:t>
+              <a:t>07-05-2020</a:t>
             </a:fld>
             <a:endParaRPr lang="en-IN"/>
           </a:p>
@@ -6292,7 +6219,7 @@
           <a:p>
             <a:fld id="{EAE9C118-8551-4CED-89C6-F63B7BEEF840}" type="datetimeFigureOut">
               <a:rPr lang="en-IN" smtClean="0"/>
-              <a:t>04-05-2020</a:t>
+              <a:t>07-05-2020</a:t>
             </a:fld>
             <a:endParaRPr lang="en-IN"/>
           </a:p>
@@ -6666,7 +6593,7 @@
           <a:p>
             <a:fld id="{EAE9C118-8551-4CED-89C6-F63B7BEEF840}" type="datetimeFigureOut">
               <a:rPr lang="en-IN" smtClean="0"/>
-              <a:t>04-05-2020</a:t>
+              <a:t>07-05-2020</a:t>
             </a:fld>
             <a:endParaRPr lang="en-IN"/>
           </a:p>
@@ -6789,7 +6716,7 @@
           <a:p>
             <a:fld id="{EAE9C118-8551-4CED-89C6-F63B7BEEF840}" type="datetimeFigureOut">
               <a:rPr lang="en-IN" smtClean="0"/>
-              <a:t>04-05-2020</a:t>
+              <a:t>07-05-2020</a:t>
             </a:fld>
             <a:endParaRPr lang="en-IN"/>
           </a:p>
@@ -6884,7 +6811,7 @@
           <a:p>
             <a:fld id="{EAE9C118-8551-4CED-89C6-F63B7BEEF840}" type="datetimeFigureOut">
               <a:rPr lang="en-IN" smtClean="0"/>
-              <a:t>04-05-2020</a:t>
+              <a:t>07-05-2020</a:t>
             </a:fld>
             <a:endParaRPr lang="en-IN"/>
           </a:p>
@@ -7139,7 +7066,7 @@
           <a:p>
             <a:fld id="{EAE9C118-8551-4CED-89C6-F63B7BEEF840}" type="datetimeFigureOut">
               <a:rPr lang="en-IN" smtClean="0"/>
-              <a:t>04-05-2020</a:t>
+              <a:t>07-05-2020</a:t>
             </a:fld>
             <a:endParaRPr lang="en-IN"/>
           </a:p>
@@ -7402,7 +7329,7 @@
           <a:p>
             <a:fld id="{EAE9C118-8551-4CED-89C6-F63B7BEEF840}" type="datetimeFigureOut">
               <a:rPr lang="en-IN" smtClean="0"/>
-              <a:t>04-05-2020</a:t>
+              <a:t>07-05-2020</a:t>
             </a:fld>
             <a:endParaRPr lang="en-IN"/>
           </a:p>
@@ -8145,7 +8072,7 @@
           <a:p>
             <a:fld id="{EAE9C118-8551-4CED-89C6-F63B7BEEF840}" type="datetimeFigureOut">
               <a:rPr lang="en-IN" smtClean="0"/>
-              <a:t>04-05-2020</a:t>
+              <a:t>07-05-2020</a:t>
             </a:fld>
             <a:endParaRPr lang="en-IN"/>
           </a:p>
@@ -8744,7 +8671,7 @@
                 <a16:creationId xmlns:a16="http://schemas.microsoft.com/office/drawing/2014/main" id="{9F4444CE-BC8D-4D61-B303-4C05614E62AB}"/>
               </a:ext>
               <a:ext uri="{C183D7F6-B498-43B3-948B-1728B52AA6E4}">
-                <adec:decorative xmlns:adec="http://schemas.microsoft.com/office/drawing/2017/decorative" val="1"/>
+                <adec:decorative xmlns:adec="http://schemas.microsoft.com/office/drawing/2017/decorative" xmlns="" val="1"/>
               </a:ext>
             </a:extLst>
           </p:cNvPr>
@@ -8825,8 +8752,12 @@
           <a:lstStyle/>
           <a:p>
             <a:r>
+              <a:rPr lang="en-US" dirty="0" smtClean="0"/>
+              <a:t>Two </a:t>
+            </a:r>
+            <a:r>
               <a:rPr lang="en-US" dirty="0"/>
-              <a:t>Three ways to use </a:t>
+              <a:t>ways to use </a:t>
             </a:r>
             <a:r>
               <a:rPr lang="en-US" dirty="0" err="1"/>
@@ -8844,7 +8775,7 @@
                 <a16:creationId xmlns:a16="http://schemas.microsoft.com/office/drawing/2014/main" id="{73772B81-181F-48B7-8826-4D9686D15DF5}"/>
               </a:ext>
               <a:ext uri="{C183D7F6-B498-43B3-948B-1728B52AA6E4}">
-                <adec:decorative xmlns:adec="http://schemas.microsoft.com/office/drawing/2017/decorative" val="1"/>
+                <adec:decorative xmlns:adec="http://schemas.microsoft.com/office/drawing/2017/decorative" xmlns="" val="1"/>
               </a:ext>
             </a:extLst>
           </p:cNvPr>
@@ -8902,7 +8833,7 @@
                 <a16:creationId xmlns:a16="http://schemas.microsoft.com/office/drawing/2014/main" id="{B2205F6E-03C6-4E92-877C-E2482F6599AA}"/>
               </a:ext>
               <a:ext uri="{C183D7F6-B498-43B3-948B-1728B52AA6E4}">
-                <adec:decorative xmlns:adec="http://schemas.microsoft.com/office/drawing/2017/decorative" val="1"/>
+                <adec:decorative xmlns:adec="http://schemas.microsoft.com/office/drawing/2017/decorative" xmlns="" val="1"/>
               </a:ext>
             </a:extLst>
           </p:cNvPr>
@@ -8968,7 +8899,7 @@
             <p:ph idx="1"/>
             <p:extLst>
               <p:ext uri="{D42A27DB-BD31-4B8C-83A1-F6EECF244321}">
-                <p14:modId xmlns:p14="http://schemas.microsoft.com/office/powerpoint/2010/main" val="2362745245"/>
+                <p14:modId xmlns:p14="http://schemas.microsoft.com/office/powerpoint/2010/main" val="3194256592"/>
               </p:ext>
             </p:extLst>
           </p:nvPr>
@@ -8987,6 +8918,524 @@
     <p:extLst>
       <p:ext uri="{BB962C8B-B14F-4D97-AF65-F5344CB8AC3E}">
         <p14:creationId xmlns:p14="http://schemas.microsoft.com/office/powerpoint/2010/main" val="2858961065"/>
+      </p:ext>
+    </p:extLst>
+  </p:cSld>
+  <p:clrMapOvr>
+    <a:masterClrMapping/>
+  </p:clrMapOvr>
+</p:sld>
+</file>
+
+<file path=ppt/slides/slide3.xml><?xml version="1.0" encoding="utf-8"?>
+<p:sld xmlns:a="http://schemas.openxmlformats.org/drawingml/2006/main" xmlns:r="http://schemas.openxmlformats.org/officeDocument/2006/relationships" xmlns:p="http://schemas.openxmlformats.org/presentationml/2006/main">
+  <p:cSld>
+    <p:spTree>
+      <p:nvGrpSpPr>
+        <p:cNvPr id="1" name=""/>
+        <p:cNvGrpSpPr/>
+        <p:nvPr/>
+      </p:nvGrpSpPr>
+      <p:grpSpPr>
+        <a:xfrm>
+          <a:off x="0" y="0"/>
+          <a:ext cx="0" cy="0"/>
+          <a:chOff x="0" y="0"/>
+          <a:chExt cx="0" cy="0"/>
+        </a:xfrm>
+      </p:grpSpPr>
+      <p:sp>
+        <p:nvSpPr>
+          <p:cNvPr id="2" name="Title 1"/>
+          <p:cNvSpPr>
+            <a:spLocks noGrp="1"/>
+          </p:cNvSpPr>
+          <p:nvPr>
+            <p:ph type="title"/>
+          </p:nvPr>
+        </p:nvSpPr>
+        <p:spPr>
+          <a:xfrm>
+            <a:off x="607665" y="78377"/>
+            <a:ext cx="8596668" cy="592183"/>
+          </a:xfrm>
+        </p:spPr>
+        <p:txBody>
+          <a:bodyPr>
+            <a:normAutofit fontScale="90000"/>
+          </a:bodyPr>
+          <a:lstStyle/>
+          <a:p>
+            <a:r>
+              <a:rPr lang="en-GB" dirty="0" smtClean="0"/>
+              <a:t>JS Variables</a:t>
+            </a:r>
+            <a:endParaRPr lang="en-GB" dirty="0"/>
+          </a:p>
+        </p:txBody>
+      </p:sp>
+      <p:sp>
+        <p:nvSpPr>
+          <p:cNvPr id="3" name="Content Placeholder 2"/>
+          <p:cNvSpPr>
+            <a:spLocks noGrp="1"/>
+          </p:cNvSpPr>
+          <p:nvPr>
+            <p:ph idx="1"/>
+          </p:nvPr>
+        </p:nvSpPr>
+        <p:spPr>
+          <a:xfrm>
+            <a:off x="677334" y="670561"/>
+            <a:ext cx="8596668" cy="5370802"/>
+          </a:xfrm>
+        </p:spPr>
+        <p:txBody>
+          <a:bodyPr/>
+          <a:lstStyle/>
+          <a:p>
+            <a:r>
+              <a:rPr lang="en-GB" dirty="0" smtClean="0"/>
+              <a:t>Variables can be declared in </a:t>
+            </a:r>
+            <a:r>
+              <a:rPr lang="en-GB" dirty="0" err="1" smtClean="0"/>
+              <a:t>js</a:t>
+            </a:r>
+            <a:r>
+              <a:rPr lang="en-GB" dirty="0" smtClean="0"/>
+              <a:t> using the </a:t>
+            </a:r>
+            <a:r>
+              <a:rPr lang="en-GB" dirty="0" err="1" smtClean="0"/>
+              <a:t>var</a:t>
+            </a:r>
+            <a:r>
+              <a:rPr lang="en-GB" dirty="0" smtClean="0"/>
+              <a:t> keyword.</a:t>
+            </a:r>
+          </a:p>
+          <a:p>
+            <a:r>
+              <a:rPr lang="en-GB" dirty="0" err="1" smtClean="0"/>
+              <a:t>var</a:t>
+            </a:r>
+            <a:r>
+              <a:rPr lang="en-GB" dirty="0" smtClean="0"/>
+              <a:t> Rudhra = ‘Rudhra’;  //String</a:t>
+            </a:r>
+          </a:p>
+          <a:p>
+            <a:r>
+              <a:rPr lang="en-GB" dirty="0" err="1" smtClean="0"/>
+              <a:t>var</a:t>
+            </a:r>
+            <a:r>
+              <a:rPr lang="en-GB" dirty="0" smtClean="0"/>
+              <a:t> </a:t>
+            </a:r>
+            <a:r>
+              <a:rPr lang="en-GB" dirty="0" err="1" smtClean="0"/>
+              <a:t>isTrue</a:t>
+            </a:r>
+            <a:r>
+              <a:rPr lang="en-GB" dirty="0" smtClean="0"/>
+              <a:t> = false; //Boolean</a:t>
+            </a:r>
+          </a:p>
+          <a:p>
+            <a:r>
+              <a:rPr lang="en-GB" dirty="0" err="1" smtClean="0"/>
+              <a:t>var</a:t>
+            </a:r>
+            <a:r>
+              <a:rPr lang="en-GB" dirty="0" smtClean="0"/>
+              <a:t> number = 10 ;</a:t>
+            </a:r>
+          </a:p>
+          <a:p>
+            <a:r>
+              <a:rPr lang="en-GB" dirty="0" err="1" smtClean="0"/>
+              <a:t>var</a:t>
+            </a:r>
+            <a:r>
+              <a:rPr lang="en-GB" dirty="0" smtClean="0"/>
+              <a:t> array = [56, ‘Tam </a:t>
+            </a:r>
+            <a:r>
+              <a:rPr lang="en-GB" dirty="0" err="1" smtClean="0"/>
+              <a:t>Tam’,true</a:t>
+            </a:r>
+            <a:r>
+              <a:rPr lang="en-GB" dirty="0" smtClean="0"/>
+              <a:t>, </a:t>
+            </a:r>
+            <a:r>
+              <a:rPr lang="en-GB" dirty="0" err="1" smtClean="0"/>
+              <a:t>isTrue</a:t>
+            </a:r>
+            <a:r>
+              <a:rPr lang="en-GB" dirty="0" smtClean="0"/>
+              <a:t>]; //Array</a:t>
+            </a:r>
+          </a:p>
+          <a:p>
+            <a:r>
+              <a:rPr lang="en-GB" dirty="0" err="1" smtClean="0"/>
+              <a:t>var</a:t>
+            </a:r>
+            <a:r>
+              <a:rPr lang="en-GB" dirty="0" smtClean="0"/>
+              <a:t> object = {</a:t>
+            </a:r>
+          </a:p>
+          <a:p>
+            <a:pPr marL="0" indent="0">
+              <a:buNone/>
+            </a:pPr>
+            <a:r>
+              <a:rPr lang="en-GB" dirty="0"/>
+              <a:t>	</a:t>
+            </a:r>
+            <a:r>
+              <a:rPr lang="en-GB" dirty="0" smtClean="0"/>
+              <a:t>		name: ‘Rudhra’,</a:t>
+            </a:r>
+          </a:p>
+          <a:p>
+            <a:pPr marL="0" indent="0">
+              <a:buNone/>
+            </a:pPr>
+            <a:r>
+              <a:rPr lang="en-GB" dirty="0"/>
+              <a:t>	</a:t>
+            </a:r>
+            <a:r>
+              <a:rPr lang="en-GB" dirty="0" smtClean="0"/>
+              <a:t>		</a:t>
+            </a:r>
+            <a:r>
+              <a:rPr lang="en-GB" dirty="0" err="1" smtClean="0"/>
+              <a:t>LastName</a:t>
+            </a:r>
+            <a:r>
+              <a:rPr lang="en-GB" dirty="0" smtClean="0"/>
+              <a:t>: ‘Koul’	</a:t>
+            </a:r>
+            <a:endParaRPr lang="en-GB" dirty="0"/>
+          </a:p>
+          <a:p>
+            <a:pPr marL="0" indent="0">
+              <a:buNone/>
+            </a:pPr>
+            <a:r>
+              <a:rPr lang="en-GB" dirty="0" smtClean="0"/>
+              <a:t>`			}      //Array</a:t>
+            </a:r>
+            <a:endParaRPr lang="en-GB" dirty="0"/>
+          </a:p>
+          <a:p>
+            <a:r>
+              <a:rPr lang="en-GB" dirty="0" smtClean="0"/>
+              <a:t> </a:t>
+            </a:r>
+            <a:endParaRPr lang="en-GB" dirty="0"/>
+          </a:p>
+        </p:txBody>
+      </p:sp>
+    </p:spTree>
+    <p:extLst>
+      <p:ext uri="{BB962C8B-B14F-4D97-AF65-F5344CB8AC3E}">
+        <p14:creationId xmlns:p14="http://schemas.microsoft.com/office/powerpoint/2010/main" val="3175968218"/>
+      </p:ext>
+    </p:extLst>
+  </p:cSld>
+  <p:clrMapOvr>
+    <a:masterClrMapping/>
+  </p:clrMapOvr>
+</p:sld>
+</file>
+
+<file path=ppt/slides/slide4.xml><?xml version="1.0" encoding="utf-8"?>
+<p:sld xmlns:a="http://schemas.openxmlformats.org/drawingml/2006/main" xmlns:r="http://schemas.openxmlformats.org/officeDocument/2006/relationships" xmlns:p="http://schemas.openxmlformats.org/presentationml/2006/main">
+  <p:cSld>
+    <p:spTree>
+      <p:nvGrpSpPr>
+        <p:cNvPr id="1" name=""/>
+        <p:cNvGrpSpPr/>
+        <p:nvPr/>
+      </p:nvGrpSpPr>
+      <p:grpSpPr>
+        <a:xfrm>
+          <a:off x="0" y="0"/>
+          <a:ext cx="0" cy="0"/>
+          <a:chOff x="0" y="0"/>
+          <a:chExt cx="0" cy="0"/>
+        </a:xfrm>
+      </p:grpSpPr>
+      <p:sp>
+        <p:nvSpPr>
+          <p:cNvPr id="2" name="Title 1"/>
+          <p:cNvSpPr>
+            <a:spLocks noGrp="1"/>
+          </p:cNvSpPr>
+          <p:nvPr>
+            <p:ph type="title"/>
+          </p:nvPr>
+        </p:nvSpPr>
+        <p:spPr>
+          <a:xfrm>
+            <a:off x="607665" y="78377"/>
+            <a:ext cx="8596668" cy="592183"/>
+          </a:xfrm>
+        </p:spPr>
+        <p:txBody>
+          <a:bodyPr>
+            <a:normAutofit fontScale="90000"/>
+          </a:bodyPr>
+          <a:lstStyle/>
+          <a:p>
+            <a:r>
+              <a:rPr lang="en-GB" dirty="0" smtClean="0"/>
+              <a:t>If Condition</a:t>
+            </a:r>
+            <a:endParaRPr lang="en-GB" dirty="0"/>
+          </a:p>
+        </p:txBody>
+      </p:sp>
+      <p:sp>
+        <p:nvSpPr>
+          <p:cNvPr id="3" name="Content Placeholder 2"/>
+          <p:cNvSpPr>
+            <a:spLocks noGrp="1"/>
+          </p:cNvSpPr>
+          <p:nvPr>
+            <p:ph idx="1"/>
+          </p:nvPr>
+        </p:nvSpPr>
+        <p:spPr>
+          <a:xfrm>
+            <a:off x="677334" y="670561"/>
+            <a:ext cx="8596668" cy="5370802"/>
+          </a:xfrm>
+        </p:spPr>
+        <p:txBody>
+          <a:bodyPr>
+            <a:normAutofit fontScale="85000" lnSpcReduction="20000"/>
+          </a:bodyPr>
+          <a:lstStyle/>
+          <a:p>
+            <a:r>
+              <a:rPr lang="en-GB" dirty="0" smtClean="0"/>
+              <a:t>Syntax :</a:t>
+            </a:r>
+          </a:p>
+          <a:p>
+            <a:pPr lvl="1"/>
+            <a:r>
+              <a:rPr lang="en-GB" dirty="0" smtClean="0"/>
+              <a:t>If(//condition to check) {</a:t>
+            </a:r>
+          </a:p>
+          <a:p>
+            <a:pPr marL="457200" lvl="1" indent="0">
+              <a:buNone/>
+            </a:pPr>
+            <a:r>
+              <a:rPr lang="en-GB" dirty="0" smtClean="0"/>
+              <a:t>        //Code to execute if condition is true</a:t>
+            </a:r>
+            <a:endParaRPr lang="en-GB" dirty="0"/>
+          </a:p>
+          <a:p>
+            <a:pPr marL="457200" lvl="1" indent="0">
+              <a:buNone/>
+            </a:pPr>
+            <a:r>
+              <a:rPr lang="en-GB" dirty="0"/>
+              <a:t> </a:t>
+            </a:r>
+            <a:r>
+              <a:rPr lang="en-GB" dirty="0" smtClean="0"/>
+              <a:t>       } </a:t>
+            </a:r>
+            <a:r>
+              <a:rPr lang="en-GB" dirty="0"/>
+              <a:t>else if </a:t>
+            </a:r>
+            <a:r>
+              <a:rPr lang="en-GB" dirty="0" smtClean="0"/>
+              <a:t>(//</a:t>
+            </a:r>
+            <a:r>
+              <a:rPr lang="en-GB" dirty="0"/>
+              <a:t>condition to check) {</a:t>
+            </a:r>
+          </a:p>
+          <a:p>
+            <a:pPr marL="457200" lvl="1" indent="0">
+              <a:buNone/>
+            </a:pPr>
+            <a:r>
+              <a:rPr lang="en-GB" dirty="0"/>
+              <a:t>        //Code to execute if condition is </a:t>
+            </a:r>
+            <a:r>
+              <a:rPr lang="en-GB" dirty="0" smtClean="0"/>
+              <a:t>true</a:t>
+            </a:r>
+            <a:endParaRPr lang="en-IN" dirty="0"/>
+          </a:p>
+          <a:p>
+            <a:pPr marL="57150" indent="0">
+              <a:buNone/>
+            </a:pPr>
+            <a:r>
+              <a:rPr lang="en-IN" dirty="0" smtClean="0"/>
+              <a:t>		}</a:t>
+            </a:r>
+            <a:endParaRPr lang="en-GB" dirty="0"/>
+          </a:p>
+          <a:p>
+            <a:pPr marL="57150" indent="0">
+              <a:buNone/>
+            </a:pPr>
+            <a:r>
+              <a:rPr lang="en-IN" dirty="0" smtClean="0"/>
+              <a:t>	    else{</a:t>
+            </a:r>
+          </a:p>
+          <a:p>
+            <a:pPr marL="57150" indent="0">
+              <a:buNone/>
+            </a:pPr>
+            <a:r>
+              <a:rPr lang="en-GB" dirty="0" smtClean="0"/>
+              <a:t>		//</a:t>
+            </a:r>
+            <a:r>
+              <a:rPr lang="en-GB" dirty="0"/>
+              <a:t>Code to execute if </a:t>
+            </a:r>
+            <a:r>
+              <a:rPr lang="en-GB" dirty="0" smtClean="0"/>
+              <a:t>both the above conditions are false</a:t>
+            </a:r>
+            <a:endParaRPr lang="en-IN" dirty="0"/>
+          </a:p>
+          <a:p>
+            <a:pPr marL="57150" indent="0">
+              <a:buNone/>
+            </a:pPr>
+            <a:r>
+              <a:rPr lang="en-IN" dirty="0" smtClean="0"/>
+              <a:t>		}</a:t>
+            </a:r>
+            <a:endParaRPr lang="en-IN" dirty="0"/>
+          </a:p>
+          <a:p>
+            <a:pPr marL="457200" lvl="1" indent="0">
+              <a:buNone/>
+            </a:pPr>
+            <a:endParaRPr lang="en-GB" dirty="0" smtClean="0"/>
+          </a:p>
+          <a:p>
+            <a:pPr marL="57150" indent="0">
+              <a:buNone/>
+            </a:pPr>
+            <a:r>
+              <a:rPr lang="en-GB" dirty="0" err="1"/>
+              <a:t>v</a:t>
+            </a:r>
+            <a:r>
+              <a:rPr lang="en-GB" dirty="0" err="1" smtClean="0"/>
+              <a:t>ar</a:t>
+            </a:r>
+            <a:r>
+              <a:rPr lang="en-GB" dirty="0" smtClean="0"/>
+              <a:t> username=‘Rudhra’;</a:t>
+            </a:r>
+          </a:p>
+          <a:p>
+            <a:pPr marL="57150" indent="0">
+              <a:buNone/>
+            </a:pPr>
+            <a:r>
+              <a:rPr lang="en-GB" dirty="0" smtClean="0"/>
+              <a:t>If(username){</a:t>
+            </a:r>
+          </a:p>
+          <a:p>
+            <a:pPr marL="57150" indent="0">
+              <a:buNone/>
+            </a:pPr>
+            <a:r>
+              <a:rPr lang="en-GB" dirty="0" smtClean="0"/>
+              <a:t>Console.log(</a:t>
+            </a:r>
+            <a:r>
+              <a:rPr lang="en-IN" dirty="0" smtClean="0"/>
+              <a:t>‘username has a value’</a:t>
+            </a:r>
+            <a:r>
+              <a:rPr lang="en-GB" dirty="0" smtClean="0"/>
+              <a:t>);</a:t>
+            </a:r>
+            <a:endParaRPr lang="en-GB" dirty="0"/>
+          </a:p>
+          <a:p>
+            <a:pPr marL="57150" indent="0">
+              <a:buNone/>
+            </a:pPr>
+            <a:r>
+              <a:rPr lang="en-GB" dirty="0" smtClean="0"/>
+              <a:t>}</a:t>
+            </a:r>
+          </a:p>
+          <a:p>
+            <a:pPr marL="57150" indent="0">
+              <a:buNone/>
+            </a:pPr>
+            <a:r>
+              <a:rPr lang="en-IN" dirty="0"/>
+              <a:t>e</a:t>
+            </a:r>
+            <a:r>
+              <a:rPr lang="en-IN" dirty="0" smtClean="0"/>
+              <a:t>lse{</a:t>
+            </a:r>
+          </a:p>
+          <a:p>
+            <a:pPr marL="57150" indent="0">
+              <a:buNone/>
+            </a:pPr>
+            <a:r>
+              <a:rPr lang="en-IN" dirty="0" smtClean="0"/>
+              <a:t>Console.log(‘username is empty’)</a:t>
+            </a:r>
+            <a:endParaRPr lang="en-IN" dirty="0"/>
+          </a:p>
+          <a:p>
+            <a:pPr marL="57150" indent="0">
+              <a:buNone/>
+            </a:pPr>
+            <a:r>
+              <a:rPr lang="en-IN" dirty="0" smtClean="0"/>
+              <a:t>}</a:t>
+            </a:r>
+          </a:p>
+          <a:p>
+            <a:pPr marL="57150" indent="0">
+              <a:buNone/>
+            </a:pPr>
+            <a:endParaRPr lang="en-GB" dirty="0" smtClean="0"/>
+          </a:p>
+        </p:txBody>
+      </p:sp>
+    </p:spTree>
+    <p:extLst>
+      <p:ext uri="{BB962C8B-B14F-4D97-AF65-F5344CB8AC3E}">
+        <p14:creationId xmlns:p14="http://schemas.microsoft.com/office/powerpoint/2010/main" val="1323958551"/>
       </p:ext>
     </p:extLst>
   </p:cSld>

</xml_diff>

<commit_message>
Section1 - The Basics
</commit_message>
<xml_diff>
--- a/PPT/JavaScriptTraining.pptx
+++ b/PPT/JavaScriptTraining.pptx
@@ -6,9 +6,19 @@
   </p:sldMasterIdLst>
   <p:sldIdLst>
     <p:sldId id="256" r:id="rId2"/>
-    <p:sldId id="257" r:id="rId3"/>
-    <p:sldId id="258" r:id="rId4"/>
-    <p:sldId id="259" r:id="rId5"/>
+    <p:sldId id="268" r:id="rId3"/>
+    <p:sldId id="257" r:id="rId4"/>
+    <p:sldId id="258" r:id="rId5"/>
+    <p:sldId id="259" r:id="rId6"/>
+    <p:sldId id="260" r:id="rId7"/>
+    <p:sldId id="261" r:id="rId8"/>
+    <p:sldId id="262" r:id="rId9"/>
+    <p:sldId id="263" r:id="rId10"/>
+    <p:sldId id="264" r:id="rId11"/>
+    <p:sldId id="265" r:id="rId12"/>
+    <p:sldId id="266" r:id="rId13"/>
+    <p:sldId id="267" r:id="rId14"/>
+    <p:sldId id="269" r:id="rId15"/>
   </p:sldIdLst>
   <p:sldSz cx="12192000" cy="6858000"/>
   <p:notesSz cx="6858000" cy="9144000"/>
@@ -1060,7 +1070,7 @@
                 <a14:useLocalDpi xmlns:a14="http://schemas.microsoft.com/office/drawing/2010/main" val="0"/>
               </a:ext>
               <a:ext uri="{96DAC541-7B7A-43D3-8B79-37D633B846F1}">
-                <asvg:svgBlip xmlns:asvg="http://schemas.microsoft.com/office/drawing/2016/SVG/main" xmlns="" r:embed="rId2"/>
+                <asvg:svgBlip xmlns="" xmlns:asvg="http://schemas.microsoft.com/office/drawing/2016/SVG/main" r:embed="rId2"/>
               </a:ext>
             </a:extLst>
           </a:blip>
@@ -1165,7 +1175,7 @@
                 <a14:useLocalDpi xmlns:a14="http://schemas.microsoft.com/office/drawing/2010/main" val="0"/>
               </a:ext>
               <a:ext uri="{96DAC541-7B7A-43D3-8B79-37D633B846F1}">
-                <asvg:svgBlip xmlns:asvg="http://schemas.microsoft.com/office/drawing/2016/SVG/main" xmlns="" r:embed="rId4"/>
+                <asvg:svgBlip xmlns="" xmlns:asvg="http://schemas.microsoft.com/office/drawing/2016/SVG/main" r:embed="rId4"/>
               </a:ext>
             </a:extLst>
           </a:blip>
@@ -1301,7 +1311,7 @@
                 <a14:useLocalDpi xmlns:a14="http://schemas.microsoft.com/office/drawing/2010/main" val="0"/>
               </a:ext>
               <a:ext uri="{96DAC541-7B7A-43D3-8B79-37D633B846F1}">
-                <asvg:svgBlip xmlns:asvg="http://schemas.microsoft.com/office/drawing/2016/SVG/main" xmlns="" r:embed="rId2"/>
+                <asvg:svgBlip xmlns="" xmlns:asvg="http://schemas.microsoft.com/office/drawing/2016/SVG/main" r:embed="rId2"/>
               </a:ext>
             </a:extLst>
           </a:blip>
@@ -1476,7 +1486,7 @@
                 <a14:useLocalDpi xmlns:a14="http://schemas.microsoft.com/office/drawing/2010/main" val="0"/>
               </a:ext>
               <a:ext uri="{96DAC541-7B7A-43D3-8B79-37D633B846F1}">
-                <asvg:svgBlip xmlns:asvg="http://schemas.microsoft.com/office/drawing/2016/SVG/main" xmlns="" r:embed="rId4"/>
+                <asvg:svgBlip xmlns="" xmlns:asvg="http://schemas.microsoft.com/office/drawing/2016/SVG/main" r:embed="rId4"/>
               </a:ext>
             </a:extLst>
           </a:blip>
@@ -1827,7 +1837,7 @@
   </dgm:layoutNode>
   <dgm:extLst>
     <a:ext uri="{68A01E43-0DF5-4B5B-8FA6-DAF915123BFB}">
-      <dgm1612:lstStyle xmlns:dgm1612="http://schemas.microsoft.com/office/drawing/2016/12/diagram" xmlns="">
+      <dgm1612:lstStyle xmlns="" xmlns:dgm1612="http://schemas.microsoft.com/office/drawing/2016/12/diagram">
         <a:lvl1pPr>
           <a:lnSpc>
             <a:spcPct val="100000"/>
@@ -3601,7 +3611,7 @@
           <a:p>
             <a:fld id="{EAE9C118-8551-4CED-89C6-F63B7BEEF840}" type="datetimeFigureOut">
               <a:rPr lang="en-IN" smtClean="0"/>
-              <a:t>07-05-2020</a:t>
+              <a:t>09-05-2020</a:t>
             </a:fld>
             <a:endParaRPr lang="en-IN"/>
           </a:p>
@@ -3852,7 +3862,7 @@
           <a:p>
             <a:fld id="{EAE9C118-8551-4CED-89C6-F63B7BEEF840}" type="datetimeFigureOut">
               <a:rPr lang="en-IN" smtClean="0"/>
-              <a:t>07-05-2020</a:t>
+              <a:t>09-05-2020</a:t>
             </a:fld>
             <a:endParaRPr lang="en-IN"/>
           </a:p>
@@ -4166,7 +4176,7 @@
           <a:p>
             <a:fld id="{EAE9C118-8551-4CED-89C6-F63B7BEEF840}" type="datetimeFigureOut">
               <a:rPr lang="en-IN" smtClean="0"/>
-              <a:t>07-05-2020</a:t>
+              <a:t>09-05-2020</a:t>
             </a:fld>
             <a:endParaRPr lang="en-IN"/>
           </a:p>
@@ -4507,7 +4517,7 @@
           <a:p>
             <a:fld id="{EAE9C118-8551-4CED-89C6-F63B7BEEF840}" type="datetimeFigureOut">
               <a:rPr lang="en-IN" smtClean="0"/>
-              <a:t>07-05-2020</a:t>
+              <a:t>09-05-2020</a:t>
             </a:fld>
             <a:endParaRPr lang="en-IN"/>
           </a:p>
@@ -4821,7 +4831,7 @@
           <a:p>
             <a:fld id="{EAE9C118-8551-4CED-89C6-F63B7BEEF840}" type="datetimeFigureOut">
               <a:rPr lang="en-IN" smtClean="0"/>
-              <a:t>07-05-2020</a:t>
+              <a:t>09-05-2020</a:t>
             </a:fld>
             <a:endParaRPr lang="en-IN"/>
           </a:p>
@@ -5214,7 +5224,7 @@
           <a:p>
             <a:fld id="{EAE9C118-8551-4CED-89C6-F63B7BEEF840}" type="datetimeFigureOut">
               <a:rPr lang="en-IN" smtClean="0"/>
-              <a:t>07-05-2020</a:t>
+              <a:t>09-05-2020</a:t>
             </a:fld>
             <a:endParaRPr lang="en-IN"/>
           </a:p>
@@ -5384,7 +5394,7 @@
           <a:p>
             <a:fld id="{EAE9C118-8551-4CED-89C6-F63B7BEEF840}" type="datetimeFigureOut">
               <a:rPr lang="en-IN" smtClean="0"/>
-              <a:t>07-05-2020</a:t>
+              <a:t>09-05-2020</a:t>
             </a:fld>
             <a:endParaRPr lang="en-IN"/>
           </a:p>
@@ -5564,7 +5574,7 @@
           <a:p>
             <a:fld id="{EAE9C118-8551-4CED-89C6-F63B7BEEF840}" type="datetimeFigureOut">
               <a:rPr lang="en-IN" smtClean="0"/>
-              <a:t>07-05-2020</a:t>
+              <a:t>09-05-2020</a:t>
             </a:fld>
             <a:endParaRPr lang="en-IN"/>
           </a:p>
@@ -5740,7 +5750,7 @@
           <a:p>
             <a:fld id="{EAE9C118-8551-4CED-89C6-F63B7BEEF840}" type="datetimeFigureOut">
               <a:rPr lang="en-IN" smtClean="0"/>
-              <a:t>07-05-2020</a:t>
+              <a:t>09-05-2020</a:t>
             </a:fld>
             <a:endParaRPr lang="en-IN"/>
           </a:p>
@@ -5987,7 +5997,7 @@
           <a:p>
             <a:fld id="{EAE9C118-8551-4CED-89C6-F63B7BEEF840}" type="datetimeFigureOut">
               <a:rPr lang="en-IN" smtClean="0"/>
-              <a:t>07-05-2020</a:t>
+              <a:t>09-05-2020</a:t>
             </a:fld>
             <a:endParaRPr lang="en-IN"/>
           </a:p>
@@ -6219,7 +6229,7 @@
           <a:p>
             <a:fld id="{EAE9C118-8551-4CED-89C6-F63B7BEEF840}" type="datetimeFigureOut">
               <a:rPr lang="en-IN" smtClean="0"/>
-              <a:t>07-05-2020</a:t>
+              <a:t>09-05-2020</a:t>
             </a:fld>
             <a:endParaRPr lang="en-IN"/>
           </a:p>
@@ -6593,7 +6603,7 @@
           <a:p>
             <a:fld id="{EAE9C118-8551-4CED-89C6-F63B7BEEF840}" type="datetimeFigureOut">
               <a:rPr lang="en-IN" smtClean="0"/>
-              <a:t>07-05-2020</a:t>
+              <a:t>09-05-2020</a:t>
             </a:fld>
             <a:endParaRPr lang="en-IN"/>
           </a:p>
@@ -6716,7 +6726,7 @@
           <a:p>
             <a:fld id="{EAE9C118-8551-4CED-89C6-F63B7BEEF840}" type="datetimeFigureOut">
               <a:rPr lang="en-IN" smtClean="0"/>
-              <a:t>07-05-2020</a:t>
+              <a:t>09-05-2020</a:t>
             </a:fld>
             <a:endParaRPr lang="en-IN"/>
           </a:p>
@@ -6811,7 +6821,7 @@
           <a:p>
             <a:fld id="{EAE9C118-8551-4CED-89C6-F63B7BEEF840}" type="datetimeFigureOut">
               <a:rPr lang="en-IN" smtClean="0"/>
-              <a:t>07-05-2020</a:t>
+              <a:t>09-05-2020</a:t>
             </a:fld>
             <a:endParaRPr lang="en-IN"/>
           </a:p>
@@ -7066,7 +7076,7 @@
           <a:p>
             <a:fld id="{EAE9C118-8551-4CED-89C6-F63B7BEEF840}" type="datetimeFigureOut">
               <a:rPr lang="en-IN" smtClean="0"/>
-              <a:t>07-05-2020</a:t>
+              <a:t>09-05-2020</a:t>
             </a:fld>
             <a:endParaRPr lang="en-IN"/>
           </a:p>
@@ -7329,7 +7339,7 @@
           <a:p>
             <a:fld id="{EAE9C118-8551-4CED-89C6-F63B7BEEF840}" type="datetimeFigureOut">
               <a:rPr lang="en-IN" smtClean="0"/>
-              <a:t>07-05-2020</a:t>
+              <a:t>09-05-2020</a:t>
             </a:fld>
             <a:endParaRPr lang="en-IN"/>
           </a:p>
@@ -8072,7 +8082,7 @@
           <a:p>
             <a:fld id="{EAE9C118-8551-4CED-89C6-F63B7BEEF840}" type="datetimeFigureOut">
               <a:rPr lang="en-IN" smtClean="0"/>
-              <a:t>07-05-2020</a:t>
+              <a:t>09-05-2020</a:t>
             </a:fld>
             <a:endParaRPr lang="en-IN"/>
           </a:p>
@@ -8638,7 +8648,605 @@
 </p:sld>
 </file>
 
+<file path=ppt/slides/slide10.xml><?xml version="1.0" encoding="utf-8"?>
+<p:sld xmlns:a="http://schemas.openxmlformats.org/drawingml/2006/main" xmlns:r="http://schemas.openxmlformats.org/officeDocument/2006/relationships" xmlns:p="http://schemas.openxmlformats.org/presentationml/2006/main">
+  <p:cSld>
+    <p:spTree>
+      <p:nvGrpSpPr>
+        <p:cNvPr id="1" name=""/>
+        <p:cNvGrpSpPr/>
+        <p:nvPr/>
+      </p:nvGrpSpPr>
+      <p:grpSpPr>
+        <a:xfrm>
+          <a:off x="0" y="0"/>
+          <a:ext cx="0" cy="0"/>
+          <a:chOff x="0" y="0"/>
+          <a:chExt cx="0" cy="0"/>
+        </a:xfrm>
+      </p:grpSpPr>
+      <p:sp>
+        <p:nvSpPr>
+          <p:cNvPr id="2" name="Title 1"/>
+          <p:cNvSpPr>
+            <a:spLocks noGrp="1"/>
+          </p:cNvSpPr>
+          <p:nvPr>
+            <p:ph type="title"/>
+          </p:nvPr>
+        </p:nvSpPr>
+        <p:spPr>
+          <a:xfrm>
+            <a:off x="411863" y="0"/>
+            <a:ext cx="8596668" cy="511277"/>
+          </a:xfrm>
+        </p:spPr>
+        <p:txBody>
+          <a:bodyPr>
+            <a:normAutofit fontScale="90000"/>
+          </a:bodyPr>
+          <a:lstStyle/>
+          <a:p>
+            <a:r>
+              <a:rPr lang="en-GB" dirty="0" smtClean="0"/>
+              <a:t>functions</a:t>
+            </a:r>
+            <a:endParaRPr lang="en-GB" dirty="0"/>
+          </a:p>
+        </p:txBody>
+      </p:sp>
+      <p:sp>
+        <p:nvSpPr>
+          <p:cNvPr id="3" name="Content Placeholder 2"/>
+          <p:cNvSpPr>
+            <a:spLocks noGrp="1"/>
+          </p:cNvSpPr>
+          <p:nvPr>
+            <p:ph idx="1"/>
+          </p:nvPr>
+        </p:nvSpPr>
+        <p:spPr>
+          <a:xfrm>
+            <a:off x="677334" y="835743"/>
+            <a:ext cx="8596668" cy="5205620"/>
+          </a:xfrm>
+        </p:spPr>
+        <p:txBody>
+          <a:bodyPr/>
+          <a:lstStyle/>
+          <a:p>
+            <a:r>
+              <a:rPr lang="en-GB" dirty="0" smtClean="0"/>
+              <a:t>Syntax for declaration</a:t>
+            </a:r>
+          </a:p>
+          <a:p>
+            <a:pPr lvl="1"/>
+            <a:r>
+              <a:rPr lang="en-GB" sz="2400" dirty="0" smtClean="0"/>
+              <a:t>function </a:t>
+            </a:r>
+            <a:r>
+              <a:rPr lang="en-GB" sz="2400" dirty="0" err="1" smtClean="0"/>
+              <a:t>functionName</a:t>
+            </a:r>
+            <a:r>
+              <a:rPr lang="en-GB" sz="2400" dirty="0" smtClean="0"/>
+              <a:t> (//0 or more Parameters) {</a:t>
+            </a:r>
+          </a:p>
+          <a:p>
+            <a:pPr marL="800100" lvl="2" indent="0">
+              <a:buNone/>
+            </a:pPr>
+            <a:r>
+              <a:rPr lang="en-GB" sz="2400" dirty="0" smtClean="0"/>
+              <a:t>//function body</a:t>
+            </a:r>
+          </a:p>
+          <a:p>
+            <a:pPr marL="800100" lvl="2" indent="0">
+              <a:buNone/>
+            </a:pPr>
+            <a:r>
+              <a:rPr lang="en-GB" sz="2400" dirty="0" smtClean="0"/>
+              <a:t>// optional return</a:t>
+            </a:r>
+            <a:endParaRPr lang="en-GB" sz="2400" dirty="0"/>
+          </a:p>
+          <a:p>
+            <a:pPr marL="800100" lvl="2" indent="0">
+              <a:buNone/>
+            </a:pPr>
+            <a:r>
+              <a:rPr lang="en-GB" sz="2400" dirty="0" smtClean="0"/>
+              <a:t>} </a:t>
+            </a:r>
+          </a:p>
+          <a:p>
+            <a:r>
+              <a:rPr lang="en-GB" dirty="0" smtClean="0"/>
+              <a:t>Syntax for Invoking</a:t>
+            </a:r>
+          </a:p>
+          <a:p>
+            <a:pPr lvl="1"/>
+            <a:r>
+              <a:rPr lang="en-GB" sz="2400" dirty="0" err="1" smtClean="0"/>
+              <a:t>functionName</a:t>
+            </a:r>
+            <a:r>
+              <a:rPr lang="en-GB" sz="2400" dirty="0" smtClean="0"/>
+              <a:t>(//Arguments);</a:t>
+            </a:r>
+            <a:endParaRPr lang="en-GB" sz="2400" dirty="0"/>
+          </a:p>
+          <a:p>
+            <a:pPr marL="800100" lvl="2" indent="0">
+              <a:buNone/>
+            </a:pPr>
+            <a:r>
+              <a:rPr lang="en-GB" sz="2400" dirty="0" err="1" smtClean="0"/>
+              <a:t>functionName</a:t>
+            </a:r>
+            <a:r>
+              <a:rPr lang="en-GB" sz="2400" dirty="0" smtClean="0"/>
+              <a:t>();</a:t>
+            </a:r>
+          </a:p>
+          <a:p>
+            <a:pPr marL="800100" lvl="2" indent="0">
+              <a:buNone/>
+            </a:pPr>
+            <a:r>
+              <a:rPr lang="en-GB" sz="2400" dirty="0" err="1"/>
+              <a:t>v</a:t>
+            </a:r>
+            <a:r>
+              <a:rPr lang="en-GB" sz="2400" dirty="0" err="1" smtClean="0"/>
+              <a:t>ar</a:t>
+            </a:r>
+            <a:r>
+              <a:rPr lang="en-GB" sz="2400" dirty="0" smtClean="0"/>
+              <a:t> result=</a:t>
+            </a:r>
+            <a:r>
+              <a:rPr lang="en-GB" sz="2400" dirty="0" err="1"/>
+              <a:t>functionName</a:t>
+            </a:r>
+            <a:r>
+              <a:rPr lang="en-GB" sz="2400" dirty="0" smtClean="0"/>
+              <a:t>(); </a:t>
+            </a:r>
+            <a:endParaRPr lang="en-GB" sz="2400" dirty="0"/>
+          </a:p>
+          <a:p>
+            <a:pPr marL="800100" lvl="2" indent="0">
+              <a:buNone/>
+            </a:pPr>
+            <a:r>
+              <a:rPr lang="en-GB" sz="2400" dirty="0" err="1"/>
+              <a:t>v</a:t>
+            </a:r>
+            <a:r>
+              <a:rPr lang="en-GB" sz="2400" dirty="0" err="1" smtClean="0"/>
+              <a:t>ar</a:t>
+            </a:r>
+            <a:r>
+              <a:rPr lang="en-GB" sz="2400" dirty="0" smtClean="0"/>
+              <a:t>  result= </a:t>
+            </a:r>
+            <a:r>
+              <a:rPr lang="en-GB" sz="2400" dirty="0" err="1"/>
+              <a:t>functionName</a:t>
+            </a:r>
+            <a:r>
+              <a:rPr lang="en-GB" sz="2400" dirty="0" smtClean="0"/>
+              <a:t>(//Arguments);</a:t>
+            </a:r>
+            <a:endParaRPr lang="en-GB" sz="2400" dirty="0"/>
+          </a:p>
+          <a:p>
+            <a:pPr marL="400050" lvl="1" indent="0">
+              <a:buNone/>
+            </a:pPr>
+            <a:endParaRPr lang="en-GB" dirty="0"/>
+          </a:p>
+          <a:p>
+            <a:pPr marL="400050" lvl="1" indent="0">
+              <a:buNone/>
+            </a:pPr>
+            <a:endParaRPr lang="en-GB" dirty="0"/>
+          </a:p>
+        </p:txBody>
+      </p:sp>
+    </p:spTree>
+    <p:extLst>
+      <p:ext uri="{BB962C8B-B14F-4D97-AF65-F5344CB8AC3E}">
+        <p14:creationId xmlns:p14="http://schemas.microsoft.com/office/powerpoint/2010/main" val="1500255886"/>
+      </p:ext>
+    </p:extLst>
+  </p:cSld>
+  <p:clrMapOvr>
+    <a:masterClrMapping/>
+  </p:clrMapOvr>
+</p:sld>
+</file>
+
+<file path=ppt/slides/slide11.xml><?xml version="1.0" encoding="utf-8"?>
+<p:sld xmlns:a="http://schemas.openxmlformats.org/drawingml/2006/main" xmlns:r="http://schemas.openxmlformats.org/officeDocument/2006/relationships" xmlns:p="http://schemas.openxmlformats.org/presentationml/2006/main">
+  <p:cSld>
+    <p:spTree>
+      <p:nvGrpSpPr>
+        <p:cNvPr id="1" name=""/>
+        <p:cNvGrpSpPr/>
+        <p:nvPr/>
+      </p:nvGrpSpPr>
+      <p:grpSpPr>
+        <a:xfrm>
+          <a:off x="0" y="0"/>
+          <a:ext cx="0" cy="0"/>
+          <a:chOff x="0" y="0"/>
+          <a:chExt cx="0" cy="0"/>
+        </a:xfrm>
+      </p:grpSpPr>
+      <p:sp>
+        <p:nvSpPr>
+          <p:cNvPr id="2" name="Title 1"/>
+          <p:cNvSpPr>
+            <a:spLocks noGrp="1"/>
+          </p:cNvSpPr>
+          <p:nvPr>
+            <p:ph type="title"/>
+          </p:nvPr>
+        </p:nvSpPr>
+        <p:spPr/>
+        <p:txBody>
+          <a:bodyPr/>
+          <a:lstStyle/>
+          <a:p>
+            <a:r>
+              <a:rPr lang="en-IN" dirty="0" smtClean="0"/>
+              <a:t>Exercise 1</a:t>
+            </a:r>
+            <a:endParaRPr lang="en-GB" dirty="0"/>
+          </a:p>
+        </p:txBody>
+      </p:sp>
+      <p:pic>
+        <p:nvPicPr>
+          <p:cNvPr id="4" name="Content Placeholder 3"/>
+          <p:cNvPicPr>
+            <a:picLocks noGrp="1" noChangeAspect="1"/>
+          </p:cNvPicPr>
+          <p:nvPr>
+            <p:ph idx="1"/>
+          </p:nvPr>
+        </p:nvPicPr>
+        <p:blipFill>
+          <a:blip r:embed="rId2"/>
+          <a:stretch>
+            <a:fillRect/>
+          </a:stretch>
+        </p:blipFill>
+        <p:spPr>
+          <a:xfrm>
+            <a:off x="471949" y="1347019"/>
+            <a:ext cx="10019070" cy="5250425"/>
+          </a:xfrm>
+          <a:prstGeom prst="rect">
+            <a:avLst/>
+          </a:prstGeom>
+        </p:spPr>
+      </p:pic>
+    </p:spTree>
+    <p:extLst>
+      <p:ext uri="{BB962C8B-B14F-4D97-AF65-F5344CB8AC3E}">
+        <p14:creationId xmlns:p14="http://schemas.microsoft.com/office/powerpoint/2010/main" val="2125206907"/>
+      </p:ext>
+    </p:extLst>
+  </p:cSld>
+  <p:clrMapOvr>
+    <a:masterClrMapping/>
+  </p:clrMapOvr>
+</p:sld>
+</file>
+
+<file path=ppt/slides/slide12.xml><?xml version="1.0" encoding="utf-8"?>
+<p:sld xmlns:a="http://schemas.openxmlformats.org/drawingml/2006/main" xmlns:r="http://schemas.openxmlformats.org/officeDocument/2006/relationships" xmlns:p="http://schemas.openxmlformats.org/presentationml/2006/main">
+  <p:cSld>
+    <p:spTree>
+      <p:nvGrpSpPr>
+        <p:cNvPr id="1" name=""/>
+        <p:cNvGrpSpPr/>
+        <p:nvPr/>
+      </p:nvGrpSpPr>
+      <p:grpSpPr>
+        <a:xfrm>
+          <a:off x="0" y="0"/>
+          <a:ext cx="0" cy="0"/>
+          <a:chOff x="0" y="0"/>
+          <a:chExt cx="0" cy="0"/>
+        </a:xfrm>
+      </p:grpSpPr>
+      <p:sp>
+        <p:nvSpPr>
+          <p:cNvPr id="2" name="Title 1"/>
+          <p:cNvSpPr>
+            <a:spLocks noGrp="1"/>
+          </p:cNvSpPr>
+          <p:nvPr>
+            <p:ph type="title"/>
+          </p:nvPr>
+        </p:nvSpPr>
+        <p:spPr>
+          <a:xfrm>
+            <a:off x="382366" y="157316"/>
+            <a:ext cx="8596668" cy="530942"/>
+          </a:xfrm>
+        </p:spPr>
+        <p:txBody>
+          <a:bodyPr>
+            <a:normAutofit fontScale="90000"/>
+          </a:bodyPr>
+          <a:lstStyle/>
+          <a:p>
+            <a:r>
+              <a:rPr lang="en-IN" dirty="0" smtClean="0"/>
+              <a:t>Exercise 2</a:t>
+            </a:r>
+            <a:endParaRPr lang="en-GB" dirty="0"/>
+          </a:p>
+        </p:txBody>
+      </p:sp>
+      <p:pic>
+        <p:nvPicPr>
+          <p:cNvPr id="4" name="Content Placeholder 3"/>
+          <p:cNvPicPr>
+            <a:picLocks noGrp="1" noChangeAspect="1"/>
+          </p:cNvPicPr>
+          <p:nvPr>
+            <p:ph idx="1"/>
+          </p:nvPr>
+        </p:nvPicPr>
+        <p:blipFill>
+          <a:blip r:embed="rId2"/>
+          <a:stretch>
+            <a:fillRect/>
+          </a:stretch>
+        </p:blipFill>
+        <p:spPr>
+          <a:xfrm>
+            <a:off x="677862" y="825910"/>
+            <a:ext cx="10678395" cy="6125495"/>
+          </a:xfrm>
+          <a:prstGeom prst="rect">
+            <a:avLst/>
+          </a:prstGeom>
+        </p:spPr>
+      </p:pic>
+    </p:spTree>
+    <p:extLst>
+      <p:ext uri="{BB962C8B-B14F-4D97-AF65-F5344CB8AC3E}">
+        <p14:creationId xmlns:p14="http://schemas.microsoft.com/office/powerpoint/2010/main" val="1220374851"/>
+      </p:ext>
+    </p:extLst>
+  </p:cSld>
+  <p:clrMapOvr>
+    <a:masterClrMapping/>
+  </p:clrMapOvr>
+</p:sld>
+</file>
+
+<file path=ppt/slides/slide13.xml><?xml version="1.0" encoding="utf-8"?>
+<p:sld xmlns:a="http://schemas.openxmlformats.org/drawingml/2006/main" xmlns:r="http://schemas.openxmlformats.org/officeDocument/2006/relationships" xmlns:p="http://schemas.openxmlformats.org/presentationml/2006/main">
+  <p:cSld>
+    <p:spTree>
+      <p:nvGrpSpPr>
+        <p:cNvPr id="1" name=""/>
+        <p:cNvGrpSpPr/>
+        <p:nvPr/>
+      </p:nvGrpSpPr>
+      <p:grpSpPr>
+        <a:xfrm>
+          <a:off x="0" y="0"/>
+          <a:ext cx="0" cy="0"/>
+          <a:chOff x="0" y="0"/>
+          <a:chExt cx="0" cy="0"/>
+        </a:xfrm>
+      </p:grpSpPr>
+      <p:sp>
+        <p:nvSpPr>
+          <p:cNvPr id="2" name="Title 1"/>
+          <p:cNvSpPr>
+            <a:spLocks noGrp="1"/>
+          </p:cNvSpPr>
+          <p:nvPr>
+            <p:ph type="title"/>
+          </p:nvPr>
+        </p:nvSpPr>
+        <p:spPr>
+          <a:xfrm>
+            <a:off x="97231" y="0"/>
+            <a:ext cx="8596668" cy="550606"/>
+          </a:xfrm>
+        </p:spPr>
+        <p:txBody>
+          <a:bodyPr>
+            <a:normAutofit fontScale="90000"/>
+          </a:bodyPr>
+          <a:lstStyle/>
+          <a:p>
+            <a:r>
+              <a:rPr lang="en-IN" dirty="0" smtClean="0"/>
+              <a:t>Exercise 3</a:t>
+            </a:r>
+            <a:endParaRPr lang="en-GB" dirty="0"/>
+          </a:p>
+        </p:txBody>
+      </p:sp>
+      <p:pic>
+        <p:nvPicPr>
+          <p:cNvPr id="4" name="Content Placeholder 3"/>
+          <p:cNvPicPr>
+            <a:picLocks noGrp="1" noChangeAspect="1"/>
+          </p:cNvPicPr>
+          <p:nvPr>
+            <p:ph idx="1"/>
+          </p:nvPr>
+        </p:nvPicPr>
+        <p:blipFill>
+          <a:blip r:embed="rId2"/>
+          <a:stretch>
+            <a:fillRect/>
+          </a:stretch>
+        </p:blipFill>
+        <p:spPr>
+          <a:xfrm>
+            <a:off x="677863" y="924233"/>
+            <a:ext cx="9400202" cy="5122606"/>
+          </a:xfrm>
+          <a:prstGeom prst="rect">
+            <a:avLst/>
+          </a:prstGeom>
+        </p:spPr>
+      </p:pic>
+    </p:spTree>
+    <p:extLst>
+      <p:ext uri="{BB962C8B-B14F-4D97-AF65-F5344CB8AC3E}">
+        <p14:creationId xmlns:p14="http://schemas.microsoft.com/office/powerpoint/2010/main" val="2167307672"/>
+      </p:ext>
+    </p:extLst>
+  </p:cSld>
+  <p:clrMapOvr>
+    <a:masterClrMapping/>
+  </p:clrMapOvr>
+</p:sld>
+</file>
+
+<file path=ppt/slides/slide14.xml><?xml version="1.0" encoding="utf-8"?>
+<p:sld xmlns:a="http://schemas.openxmlformats.org/drawingml/2006/main" xmlns:r="http://schemas.openxmlformats.org/officeDocument/2006/relationships" xmlns:p="http://schemas.openxmlformats.org/presentationml/2006/main">
+  <p:cSld>
+    <p:spTree>
+      <p:nvGrpSpPr>
+        <p:cNvPr id="1" name=""/>
+        <p:cNvGrpSpPr/>
+        <p:nvPr/>
+      </p:nvGrpSpPr>
+      <p:grpSpPr>
+        <a:xfrm>
+          <a:off x="0" y="0"/>
+          <a:ext cx="0" cy="0"/>
+          <a:chOff x="0" y="0"/>
+          <a:chExt cx="0" cy="0"/>
+        </a:xfrm>
+      </p:grpSpPr>
+      <p:sp>
+        <p:nvSpPr>
+          <p:cNvPr id="2" name="Title 1">
+            <a:extLst>
+              <a:ext uri="{FF2B5EF4-FFF2-40B4-BE49-F238E27FC236}">
+                <a16:creationId xmlns:a16="http://schemas.microsoft.com/office/drawing/2014/main" id="{8735D99D-4BB0-47A9-B676-90E55A5AA3BB}"/>
+              </a:ext>
+            </a:extLst>
+          </p:cNvPr>
+          <p:cNvSpPr>
+            <a:spLocks noGrp="1"/>
+          </p:cNvSpPr>
+          <p:nvPr>
+            <p:ph type="ctrTitle"/>
+          </p:nvPr>
+        </p:nvSpPr>
+        <p:spPr/>
+        <p:txBody>
+          <a:bodyPr/>
+          <a:lstStyle/>
+          <a:p>
+            <a:r>
+              <a:rPr lang="en-US" dirty="0" smtClean="0"/>
+              <a:t>Section 2 – </a:t>
+            </a:r>
+            <a:r>
+              <a:rPr lang="en-US" smtClean="0"/>
+              <a:t>The DOM</a:t>
+            </a:r>
+            <a:endParaRPr lang="en-IN" dirty="0"/>
+          </a:p>
+        </p:txBody>
+      </p:sp>
+    </p:spTree>
+    <p:extLst>
+      <p:ext uri="{BB962C8B-B14F-4D97-AF65-F5344CB8AC3E}">
+        <p14:creationId xmlns:p14="http://schemas.microsoft.com/office/powerpoint/2010/main" val="3256556115"/>
+      </p:ext>
+    </p:extLst>
+  </p:cSld>
+  <p:clrMapOvr>
+    <a:masterClrMapping/>
+  </p:clrMapOvr>
+</p:sld>
+</file>
+
 <file path=ppt/slides/slide2.xml><?xml version="1.0" encoding="utf-8"?>
+<p:sld xmlns:a="http://schemas.openxmlformats.org/drawingml/2006/main" xmlns:r="http://schemas.openxmlformats.org/officeDocument/2006/relationships" xmlns:p="http://schemas.openxmlformats.org/presentationml/2006/main">
+  <p:cSld>
+    <p:spTree>
+      <p:nvGrpSpPr>
+        <p:cNvPr id="1" name=""/>
+        <p:cNvGrpSpPr/>
+        <p:nvPr/>
+      </p:nvGrpSpPr>
+      <p:grpSpPr>
+        <a:xfrm>
+          <a:off x="0" y="0"/>
+          <a:ext cx="0" cy="0"/>
+          <a:chOff x="0" y="0"/>
+          <a:chExt cx="0" cy="0"/>
+        </a:xfrm>
+      </p:grpSpPr>
+      <p:sp>
+        <p:nvSpPr>
+          <p:cNvPr id="2" name="Title 1">
+            <a:extLst>
+              <a:ext uri="{FF2B5EF4-FFF2-40B4-BE49-F238E27FC236}">
+                <a16:creationId xmlns:a16="http://schemas.microsoft.com/office/drawing/2014/main" id="{8735D99D-4BB0-47A9-B676-90E55A5AA3BB}"/>
+              </a:ext>
+            </a:extLst>
+          </p:cNvPr>
+          <p:cNvSpPr>
+            <a:spLocks noGrp="1"/>
+          </p:cNvSpPr>
+          <p:nvPr>
+            <p:ph type="ctrTitle"/>
+          </p:nvPr>
+        </p:nvSpPr>
+        <p:spPr/>
+        <p:txBody>
+          <a:bodyPr/>
+          <a:lstStyle/>
+          <a:p>
+            <a:r>
+              <a:rPr lang="en-US" dirty="0" smtClean="0"/>
+              <a:t>Section 1 – The Basics</a:t>
+            </a:r>
+            <a:endParaRPr lang="en-IN" dirty="0"/>
+          </a:p>
+        </p:txBody>
+      </p:sp>
+    </p:spTree>
+    <p:extLst>
+      <p:ext uri="{BB962C8B-B14F-4D97-AF65-F5344CB8AC3E}">
+        <p14:creationId xmlns:p14="http://schemas.microsoft.com/office/powerpoint/2010/main" val="879968599"/>
+      </p:ext>
+    </p:extLst>
+  </p:cSld>
+  <p:clrMapOvr>
+    <a:masterClrMapping/>
+  </p:clrMapOvr>
+</p:sld>
+</file>
+
+<file path=ppt/slides/slide3.xml><?xml version="1.0" encoding="utf-8"?>
 <p:sld xmlns:a="http://schemas.openxmlformats.org/drawingml/2006/main" xmlns:r="http://schemas.openxmlformats.org/officeDocument/2006/relationships" xmlns:p="http://schemas.openxmlformats.org/presentationml/2006/main">
   <p:cSld>
     <p:bg>
@@ -8671,7 +9279,7 @@
                 <a16:creationId xmlns:a16="http://schemas.microsoft.com/office/drawing/2014/main" id="{9F4444CE-BC8D-4D61-B303-4C05614E62AB}"/>
               </a:ext>
               <a:ext uri="{C183D7F6-B498-43B3-948B-1728B52AA6E4}">
-                <adec:decorative xmlns:adec="http://schemas.microsoft.com/office/drawing/2017/decorative" xmlns="" val="1"/>
+                <adec:decorative xmlns="" xmlns:adec="http://schemas.microsoft.com/office/drawing/2017/decorative" val="1"/>
               </a:ext>
             </a:extLst>
           </p:cNvPr>
@@ -8775,7 +9383,7 @@
                 <a16:creationId xmlns:a16="http://schemas.microsoft.com/office/drawing/2014/main" id="{73772B81-181F-48B7-8826-4D9686D15DF5}"/>
               </a:ext>
               <a:ext uri="{C183D7F6-B498-43B3-948B-1728B52AA6E4}">
-                <adec:decorative xmlns:adec="http://schemas.microsoft.com/office/drawing/2017/decorative" xmlns="" val="1"/>
+                <adec:decorative xmlns="" xmlns:adec="http://schemas.microsoft.com/office/drawing/2017/decorative" val="1"/>
               </a:ext>
             </a:extLst>
           </p:cNvPr>
@@ -8833,7 +9441,7 @@
                 <a16:creationId xmlns:a16="http://schemas.microsoft.com/office/drawing/2014/main" id="{B2205F6E-03C6-4E92-877C-E2482F6599AA}"/>
               </a:ext>
               <a:ext uri="{C183D7F6-B498-43B3-948B-1728B52AA6E4}">
-                <adec:decorative xmlns:adec="http://schemas.microsoft.com/office/drawing/2017/decorative" xmlns="" val="1"/>
+                <adec:decorative xmlns="" xmlns:adec="http://schemas.microsoft.com/office/drawing/2017/decorative" val="1"/>
               </a:ext>
             </a:extLst>
           </p:cNvPr>
@@ -8927,235 +9535,6 @@
 </p:sld>
 </file>
 
-<file path=ppt/slides/slide3.xml><?xml version="1.0" encoding="utf-8"?>
-<p:sld xmlns:a="http://schemas.openxmlformats.org/drawingml/2006/main" xmlns:r="http://schemas.openxmlformats.org/officeDocument/2006/relationships" xmlns:p="http://schemas.openxmlformats.org/presentationml/2006/main">
-  <p:cSld>
-    <p:spTree>
-      <p:nvGrpSpPr>
-        <p:cNvPr id="1" name=""/>
-        <p:cNvGrpSpPr/>
-        <p:nvPr/>
-      </p:nvGrpSpPr>
-      <p:grpSpPr>
-        <a:xfrm>
-          <a:off x="0" y="0"/>
-          <a:ext cx="0" cy="0"/>
-          <a:chOff x="0" y="0"/>
-          <a:chExt cx="0" cy="0"/>
-        </a:xfrm>
-      </p:grpSpPr>
-      <p:sp>
-        <p:nvSpPr>
-          <p:cNvPr id="2" name="Title 1"/>
-          <p:cNvSpPr>
-            <a:spLocks noGrp="1"/>
-          </p:cNvSpPr>
-          <p:nvPr>
-            <p:ph type="title"/>
-          </p:nvPr>
-        </p:nvSpPr>
-        <p:spPr>
-          <a:xfrm>
-            <a:off x="607665" y="78377"/>
-            <a:ext cx="8596668" cy="592183"/>
-          </a:xfrm>
-        </p:spPr>
-        <p:txBody>
-          <a:bodyPr>
-            <a:normAutofit fontScale="90000"/>
-          </a:bodyPr>
-          <a:lstStyle/>
-          <a:p>
-            <a:r>
-              <a:rPr lang="en-GB" dirty="0" smtClean="0"/>
-              <a:t>JS Variables</a:t>
-            </a:r>
-            <a:endParaRPr lang="en-GB" dirty="0"/>
-          </a:p>
-        </p:txBody>
-      </p:sp>
-      <p:sp>
-        <p:nvSpPr>
-          <p:cNvPr id="3" name="Content Placeholder 2"/>
-          <p:cNvSpPr>
-            <a:spLocks noGrp="1"/>
-          </p:cNvSpPr>
-          <p:nvPr>
-            <p:ph idx="1"/>
-          </p:nvPr>
-        </p:nvSpPr>
-        <p:spPr>
-          <a:xfrm>
-            <a:off x="677334" y="670561"/>
-            <a:ext cx="8596668" cy="5370802"/>
-          </a:xfrm>
-        </p:spPr>
-        <p:txBody>
-          <a:bodyPr/>
-          <a:lstStyle/>
-          <a:p>
-            <a:r>
-              <a:rPr lang="en-GB" dirty="0" smtClean="0"/>
-              <a:t>Variables can be declared in </a:t>
-            </a:r>
-            <a:r>
-              <a:rPr lang="en-GB" dirty="0" err="1" smtClean="0"/>
-              <a:t>js</a:t>
-            </a:r>
-            <a:r>
-              <a:rPr lang="en-GB" dirty="0" smtClean="0"/>
-              <a:t> using the </a:t>
-            </a:r>
-            <a:r>
-              <a:rPr lang="en-GB" dirty="0" err="1" smtClean="0"/>
-              <a:t>var</a:t>
-            </a:r>
-            <a:r>
-              <a:rPr lang="en-GB" dirty="0" smtClean="0"/>
-              <a:t> keyword.</a:t>
-            </a:r>
-          </a:p>
-          <a:p>
-            <a:r>
-              <a:rPr lang="en-GB" dirty="0" err="1" smtClean="0"/>
-              <a:t>var</a:t>
-            </a:r>
-            <a:r>
-              <a:rPr lang="en-GB" dirty="0" smtClean="0"/>
-              <a:t> Rudhra = ‘Rudhra’;  //String</a:t>
-            </a:r>
-          </a:p>
-          <a:p>
-            <a:r>
-              <a:rPr lang="en-GB" dirty="0" err="1" smtClean="0"/>
-              <a:t>var</a:t>
-            </a:r>
-            <a:r>
-              <a:rPr lang="en-GB" dirty="0" smtClean="0"/>
-              <a:t> </a:t>
-            </a:r>
-            <a:r>
-              <a:rPr lang="en-GB" dirty="0" err="1" smtClean="0"/>
-              <a:t>isTrue</a:t>
-            </a:r>
-            <a:r>
-              <a:rPr lang="en-GB" dirty="0" smtClean="0"/>
-              <a:t> = false; //Boolean</a:t>
-            </a:r>
-          </a:p>
-          <a:p>
-            <a:r>
-              <a:rPr lang="en-GB" dirty="0" err="1" smtClean="0"/>
-              <a:t>var</a:t>
-            </a:r>
-            <a:r>
-              <a:rPr lang="en-GB" dirty="0" smtClean="0"/>
-              <a:t> number = 10 ;</a:t>
-            </a:r>
-          </a:p>
-          <a:p>
-            <a:r>
-              <a:rPr lang="en-GB" dirty="0" err="1" smtClean="0"/>
-              <a:t>var</a:t>
-            </a:r>
-            <a:r>
-              <a:rPr lang="en-GB" dirty="0" smtClean="0"/>
-              <a:t> array = [56, ‘Tam </a:t>
-            </a:r>
-            <a:r>
-              <a:rPr lang="en-GB" dirty="0" err="1" smtClean="0"/>
-              <a:t>Tam’,true</a:t>
-            </a:r>
-            <a:r>
-              <a:rPr lang="en-GB" dirty="0" smtClean="0"/>
-              <a:t>, </a:t>
-            </a:r>
-            <a:r>
-              <a:rPr lang="en-GB" dirty="0" err="1" smtClean="0"/>
-              <a:t>isTrue</a:t>
-            </a:r>
-            <a:r>
-              <a:rPr lang="en-GB" dirty="0" smtClean="0"/>
-              <a:t>]; //Array</a:t>
-            </a:r>
-          </a:p>
-          <a:p>
-            <a:r>
-              <a:rPr lang="en-GB" dirty="0" err="1" smtClean="0"/>
-              <a:t>var</a:t>
-            </a:r>
-            <a:r>
-              <a:rPr lang="en-GB" dirty="0" smtClean="0"/>
-              <a:t> object = {</a:t>
-            </a:r>
-          </a:p>
-          <a:p>
-            <a:pPr marL="0" indent="0">
-              <a:buNone/>
-            </a:pPr>
-            <a:r>
-              <a:rPr lang="en-GB" dirty="0"/>
-              <a:t>	</a:t>
-            </a:r>
-            <a:r>
-              <a:rPr lang="en-GB" dirty="0" smtClean="0"/>
-              <a:t>		name: ‘Rudhra’,</a:t>
-            </a:r>
-          </a:p>
-          <a:p>
-            <a:pPr marL="0" indent="0">
-              <a:buNone/>
-            </a:pPr>
-            <a:r>
-              <a:rPr lang="en-GB" dirty="0"/>
-              <a:t>	</a:t>
-            </a:r>
-            <a:r>
-              <a:rPr lang="en-GB" dirty="0" smtClean="0"/>
-              <a:t>		</a:t>
-            </a:r>
-            <a:r>
-              <a:rPr lang="en-GB" dirty="0" err="1" smtClean="0"/>
-              <a:t>LastName</a:t>
-            </a:r>
-            <a:r>
-              <a:rPr lang="en-GB" dirty="0" smtClean="0"/>
-              <a:t>: ‘Koul’	</a:t>
-            </a:r>
-            <a:endParaRPr lang="en-GB" dirty="0"/>
-          </a:p>
-          <a:p>
-            <a:pPr marL="0" indent="0">
-              <a:buNone/>
-            </a:pPr>
-            <a:r>
-              <a:rPr lang="en-GB" dirty="0" smtClean="0"/>
-              <a:t>`			}      //Array</a:t>
-            </a:r>
-            <a:endParaRPr lang="en-GB" dirty="0"/>
-          </a:p>
-          <a:p>
-            <a:r>
-              <a:rPr lang="en-GB" dirty="0" smtClean="0"/>
-              <a:t> </a:t>
-            </a:r>
-            <a:endParaRPr lang="en-GB" dirty="0"/>
-          </a:p>
-        </p:txBody>
-      </p:sp>
-    </p:spTree>
-    <p:extLst>
-      <p:ext uri="{BB962C8B-B14F-4D97-AF65-F5344CB8AC3E}">
-        <p14:creationId xmlns:p14="http://schemas.microsoft.com/office/powerpoint/2010/main" val="3175968218"/>
-      </p:ext>
-    </p:extLst>
-  </p:cSld>
-  <p:clrMapOvr>
-    <a:masterClrMapping/>
-  </p:clrMapOvr>
-</p:sld>
-</file>
-
 <file path=ppt/slides/slide4.xml><?xml version="1.0" encoding="utf-8"?>
 <p:sld xmlns:a="http://schemas.openxmlformats.org/drawingml/2006/main" xmlns:r="http://schemas.openxmlformats.org/officeDocument/2006/relationships" xmlns:p="http://schemas.openxmlformats.org/presentationml/2006/main">
   <p:cSld>
@@ -9197,7 +9576,7 @@
           <a:p>
             <a:r>
               <a:rPr lang="en-GB" dirty="0" smtClean="0"/>
-              <a:t>If Condition</a:t>
+              <a:t>JS Variables</a:t>
             </a:r>
             <a:endParaRPr lang="en-GB" dirty="0"/>
           </a:p>
@@ -9220,6 +9599,235 @@
           </a:xfrm>
         </p:spPr>
         <p:txBody>
+          <a:bodyPr/>
+          <a:lstStyle/>
+          <a:p>
+            <a:r>
+              <a:rPr lang="en-GB" dirty="0" smtClean="0"/>
+              <a:t>Variables can be declared in </a:t>
+            </a:r>
+            <a:r>
+              <a:rPr lang="en-GB" dirty="0" err="1" smtClean="0"/>
+              <a:t>js</a:t>
+            </a:r>
+            <a:r>
+              <a:rPr lang="en-GB" dirty="0" smtClean="0"/>
+              <a:t> using the </a:t>
+            </a:r>
+            <a:r>
+              <a:rPr lang="en-GB" dirty="0" err="1" smtClean="0"/>
+              <a:t>var</a:t>
+            </a:r>
+            <a:r>
+              <a:rPr lang="en-GB" dirty="0" smtClean="0"/>
+              <a:t> keyword.</a:t>
+            </a:r>
+          </a:p>
+          <a:p>
+            <a:r>
+              <a:rPr lang="en-GB" dirty="0" err="1" smtClean="0"/>
+              <a:t>var</a:t>
+            </a:r>
+            <a:r>
+              <a:rPr lang="en-GB" dirty="0" smtClean="0"/>
+              <a:t> Rudhra = ‘Rudhra’;  //String</a:t>
+            </a:r>
+          </a:p>
+          <a:p>
+            <a:r>
+              <a:rPr lang="en-GB" dirty="0" err="1" smtClean="0"/>
+              <a:t>var</a:t>
+            </a:r>
+            <a:r>
+              <a:rPr lang="en-GB" dirty="0" smtClean="0"/>
+              <a:t> </a:t>
+            </a:r>
+            <a:r>
+              <a:rPr lang="en-GB" dirty="0" err="1" smtClean="0"/>
+              <a:t>isTrue</a:t>
+            </a:r>
+            <a:r>
+              <a:rPr lang="en-GB" dirty="0" smtClean="0"/>
+              <a:t> = false; //Boolean</a:t>
+            </a:r>
+          </a:p>
+          <a:p>
+            <a:r>
+              <a:rPr lang="en-GB" dirty="0" err="1" smtClean="0"/>
+              <a:t>var</a:t>
+            </a:r>
+            <a:r>
+              <a:rPr lang="en-GB" dirty="0" smtClean="0"/>
+              <a:t> number = 10 ;</a:t>
+            </a:r>
+          </a:p>
+          <a:p>
+            <a:r>
+              <a:rPr lang="en-GB" dirty="0" err="1" smtClean="0"/>
+              <a:t>var</a:t>
+            </a:r>
+            <a:r>
+              <a:rPr lang="en-GB" dirty="0" smtClean="0"/>
+              <a:t> array = [56, ‘Tam </a:t>
+            </a:r>
+            <a:r>
+              <a:rPr lang="en-GB" dirty="0" err="1" smtClean="0"/>
+              <a:t>Tam’,true</a:t>
+            </a:r>
+            <a:r>
+              <a:rPr lang="en-GB" dirty="0" smtClean="0"/>
+              <a:t>, </a:t>
+            </a:r>
+            <a:r>
+              <a:rPr lang="en-GB" dirty="0" err="1" smtClean="0"/>
+              <a:t>isTrue</a:t>
+            </a:r>
+            <a:r>
+              <a:rPr lang="en-GB" dirty="0" smtClean="0"/>
+              <a:t>]; //Array</a:t>
+            </a:r>
+          </a:p>
+          <a:p>
+            <a:r>
+              <a:rPr lang="en-GB" dirty="0" err="1" smtClean="0"/>
+              <a:t>var</a:t>
+            </a:r>
+            <a:r>
+              <a:rPr lang="en-GB" dirty="0" smtClean="0"/>
+              <a:t> object = {</a:t>
+            </a:r>
+          </a:p>
+          <a:p>
+            <a:pPr marL="0" indent="0">
+              <a:buNone/>
+            </a:pPr>
+            <a:r>
+              <a:rPr lang="en-GB" dirty="0"/>
+              <a:t>	</a:t>
+            </a:r>
+            <a:r>
+              <a:rPr lang="en-GB" dirty="0" smtClean="0"/>
+              <a:t>		name: ‘Rudhra’,</a:t>
+            </a:r>
+          </a:p>
+          <a:p>
+            <a:pPr marL="0" indent="0">
+              <a:buNone/>
+            </a:pPr>
+            <a:r>
+              <a:rPr lang="en-GB" dirty="0"/>
+              <a:t>	</a:t>
+            </a:r>
+            <a:r>
+              <a:rPr lang="en-GB" dirty="0" smtClean="0"/>
+              <a:t>		</a:t>
+            </a:r>
+            <a:r>
+              <a:rPr lang="en-GB" dirty="0" err="1" smtClean="0"/>
+              <a:t>LastName</a:t>
+            </a:r>
+            <a:r>
+              <a:rPr lang="en-GB" dirty="0" smtClean="0"/>
+              <a:t>: ‘Koul’	</a:t>
+            </a:r>
+            <a:endParaRPr lang="en-GB" dirty="0"/>
+          </a:p>
+          <a:p>
+            <a:pPr marL="0" indent="0">
+              <a:buNone/>
+            </a:pPr>
+            <a:r>
+              <a:rPr lang="en-GB" dirty="0" smtClean="0"/>
+              <a:t>`			}      //Array</a:t>
+            </a:r>
+            <a:endParaRPr lang="en-GB" dirty="0"/>
+          </a:p>
+          <a:p>
+            <a:r>
+              <a:rPr lang="en-GB" dirty="0" smtClean="0"/>
+              <a:t> </a:t>
+            </a:r>
+            <a:endParaRPr lang="en-GB" dirty="0"/>
+          </a:p>
+        </p:txBody>
+      </p:sp>
+    </p:spTree>
+    <p:extLst>
+      <p:ext uri="{BB962C8B-B14F-4D97-AF65-F5344CB8AC3E}">
+        <p14:creationId xmlns:p14="http://schemas.microsoft.com/office/powerpoint/2010/main" val="3175968218"/>
+      </p:ext>
+    </p:extLst>
+  </p:cSld>
+  <p:clrMapOvr>
+    <a:masterClrMapping/>
+  </p:clrMapOvr>
+</p:sld>
+</file>
+
+<file path=ppt/slides/slide5.xml><?xml version="1.0" encoding="utf-8"?>
+<p:sld xmlns:a="http://schemas.openxmlformats.org/drawingml/2006/main" xmlns:r="http://schemas.openxmlformats.org/officeDocument/2006/relationships" xmlns:p="http://schemas.openxmlformats.org/presentationml/2006/main">
+  <p:cSld>
+    <p:spTree>
+      <p:nvGrpSpPr>
+        <p:cNvPr id="1" name=""/>
+        <p:cNvGrpSpPr/>
+        <p:nvPr/>
+      </p:nvGrpSpPr>
+      <p:grpSpPr>
+        <a:xfrm>
+          <a:off x="0" y="0"/>
+          <a:ext cx="0" cy="0"/>
+          <a:chOff x="0" y="0"/>
+          <a:chExt cx="0" cy="0"/>
+        </a:xfrm>
+      </p:grpSpPr>
+      <p:sp>
+        <p:nvSpPr>
+          <p:cNvPr id="2" name="Title 1"/>
+          <p:cNvSpPr>
+            <a:spLocks noGrp="1"/>
+          </p:cNvSpPr>
+          <p:nvPr>
+            <p:ph type="title"/>
+          </p:nvPr>
+        </p:nvSpPr>
+        <p:spPr>
+          <a:xfrm>
+            <a:off x="607665" y="78377"/>
+            <a:ext cx="8596668" cy="592183"/>
+          </a:xfrm>
+        </p:spPr>
+        <p:txBody>
+          <a:bodyPr>
+            <a:normAutofit fontScale="90000"/>
+          </a:bodyPr>
+          <a:lstStyle/>
+          <a:p>
+            <a:r>
+              <a:rPr lang="en-GB" dirty="0" smtClean="0"/>
+              <a:t>If Condition</a:t>
+            </a:r>
+            <a:endParaRPr lang="en-GB" dirty="0"/>
+          </a:p>
+        </p:txBody>
+      </p:sp>
+      <p:sp>
+        <p:nvSpPr>
+          <p:cNvPr id="3" name="Content Placeholder 2"/>
+          <p:cNvSpPr>
+            <a:spLocks noGrp="1"/>
+          </p:cNvSpPr>
+          <p:nvPr>
+            <p:ph idx="1"/>
+          </p:nvPr>
+        </p:nvSpPr>
+        <p:spPr>
+          <a:xfrm>
+            <a:off x="677334" y="670561"/>
+            <a:ext cx="8596668" cy="5370802"/>
+          </a:xfrm>
+        </p:spPr>
+        <p:txBody>
           <a:bodyPr>
             <a:normAutofit fontScale="85000" lnSpcReduction="20000"/>
           </a:bodyPr>
@@ -9436,6 +10044,900 @@
     <p:extLst>
       <p:ext uri="{BB962C8B-B14F-4D97-AF65-F5344CB8AC3E}">
         <p14:creationId xmlns:p14="http://schemas.microsoft.com/office/powerpoint/2010/main" val="1323958551"/>
+      </p:ext>
+    </p:extLst>
+  </p:cSld>
+  <p:clrMapOvr>
+    <a:masterClrMapping/>
+  </p:clrMapOvr>
+</p:sld>
+</file>
+
+<file path=ppt/slides/slide6.xml><?xml version="1.0" encoding="utf-8"?>
+<p:sld xmlns:a="http://schemas.openxmlformats.org/drawingml/2006/main" xmlns:r="http://schemas.openxmlformats.org/officeDocument/2006/relationships" xmlns:p="http://schemas.openxmlformats.org/presentationml/2006/main">
+  <p:cSld>
+    <p:spTree>
+      <p:nvGrpSpPr>
+        <p:cNvPr id="1" name=""/>
+        <p:cNvGrpSpPr/>
+        <p:nvPr/>
+      </p:nvGrpSpPr>
+      <p:grpSpPr>
+        <a:xfrm>
+          <a:off x="0" y="0"/>
+          <a:ext cx="0" cy="0"/>
+          <a:chOff x="0" y="0"/>
+          <a:chExt cx="0" cy="0"/>
+        </a:xfrm>
+      </p:grpSpPr>
+      <p:sp>
+        <p:nvSpPr>
+          <p:cNvPr id="2" name="Title 1"/>
+          <p:cNvSpPr>
+            <a:spLocks noGrp="1"/>
+          </p:cNvSpPr>
+          <p:nvPr>
+            <p:ph type="title"/>
+          </p:nvPr>
+        </p:nvSpPr>
+        <p:spPr>
+          <a:xfrm>
+            <a:off x="607665" y="78377"/>
+            <a:ext cx="8596668" cy="592183"/>
+          </a:xfrm>
+        </p:spPr>
+        <p:txBody>
+          <a:bodyPr>
+            <a:normAutofit fontScale="90000"/>
+          </a:bodyPr>
+          <a:lstStyle/>
+          <a:p>
+            <a:r>
+              <a:rPr lang="en-GB" dirty="0" smtClean="0"/>
+              <a:t>Switch</a:t>
+            </a:r>
+            <a:endParaRPr lang="en-GB" dirty="0"/>
+          </a:p>
+        </p:txBody>
+      </p:sp>
+      <p:sp>
+        <p:nvSpPr>
+          <p:cNvPr id="3" name="Content Placeholder 2"/>
+          <p:cNvSpPr>
+            <a:spLocks noGrp="1"/>
+          </p:cNvSpPr>
+          <p:nvPr>
+            <p:ph idx="1"/>
+          </p:nvPr>
+        </p:nvSpPr>
+        <p:spPr>
+          <a:xfrm>
+            <a:off x="677334" y="670561"/>
+            <a:ext cx="8596668" cy="5370802"/>
+          </a:xfrm>
+        </p:spPr>
+        <p:txBody>
+          <a:bodyPr>
+            <a:normAutofit/>
+          </a:bodyPr>
+          <a:lstStyle/>
+          <a:p>
+            <a:r>
+              <a:rPr lang="en-GB" dirty="0" smtClean="0"/>
+              <a:t>Syntax :</a:t>
+            </a:r>
+          </a:p>
+          <a:p>
+            <a:pPr marL="0" indent="0">
+              <a:buNone/>
+            </a:pPr>
+            <a:r>
+              <a:rPr lang="en-GB" dirty="0"/>
+              <a:t>switch </a:t>
+            </a:r>
+            <a:r>
+              <a:rPr lang="en-GB" dirty="0" smtClean="0"/>
+              <a:t>(//variable to check)</a:t>
+            </a:r>
+            <a:r>
+              <a:rPr lang="en-GB" dirty="0"/>
+              <a:t> {</a:t>
+            </a:r>
+          </a:p>
+          <a:p>
+            <a:pPr marL="400050" lvl="1" indent="0">
+              <a:buNone/>
+            </a:pPr>
+            <a:r>
+              <a:rPr lang="en-GB" dirty="0"/>
+              <a:t>    case </a:t>
+            </a:r>
+            <a:r>
+              <a:rPr lang="en-GB" dirty="0" smtClean="0"/>
+              <a:t>//value to check:</a:t>
+            </a:r>
+            <a:endParaRPr lang="en-GB" dirty="0"/>
+          </a:p>
+          <a:p>
+            <a:pPr marL="400050" lvl="1" indent="0">
+              <a:buNone/>
+            </a:pPr>
+            <a:r>
+              <a:rPr lang="en-GB" dirty="0"/>
+              <a:t>    </a:t>
+            </a:r>
+            <a:r>
+              <a:rPr lang="en-GB" dirty="0" smtClean="0"/>
+              <a:t>//code to execute</a:t>
+            </a:r>
+            <a:endParaRPr lang="en-GB" dirty="0"/>
+          </a:p>
+          <a:p>
+            <a:pPr marL="400050" lvl="1" indent="0">
+              <a:buNone/>
+            </a:pPr>
+            <a:r>
+              <a:rPr lang="en-GB" dirty="0"/>
+              <a:t>        break;</a:t>
+            </a:r>
+          </a:p>
+          <a:p>
+            <a:pPr marL="400050" lvl="1" indent="0">
+              <a:buNone/>
+            </a:pPr>
+            <a:r>
+              <a:rPr lang="en-GB" dirty="0"/>
+              <a:t>     </a:t>
+            </a:r>
+            <a:r>
+              <a:rPr lang="en-GB" dirty="0" smtClean="0"/>
+              <a:t>case</a:t>
+            </a:r>
+            <a:r>
+              <a:rPr lang="en-GB" dirty="0"/>
+              <a:t> //value to check:</a:t>
+            </a:r>
+          </a:p>
+          <a:p>
+            <a:pPr marL="400050" lvl="1" indent="0">
+              <a:buNone/>
+            </a:pPr>
+            <a:r>
+              <a:rPr lang="en-GB" dirty="0"/>
+              <a:t>    //code to execute</a:t>
+            </a:r>
+          </a:p>
+          <a:p>
+            <a:pPr marL="400050" lvl="1" indent="0">
+              <a:buNone/>
+            </a:pPr>
+            <a:r>
+              <a:rPr lang="en-GB" dirty="0"/>
+              <a:t>        break;</a:t>
+            </a:r>
+          </a:p>
+          <a:p>
+            <a:pPr marL="400050" lvl="1" indent="0">
+              <a:buNone/>
+            </a:pPr>
+            <a:r>
+              <a:rPr lang="en-GB" dirty="0"/>
+              <a:t>    default:</a:t>
+            </a:r>
+          </a:p>
+          <a:p>
+            <a:pPr marL="400050" lvl="1" indent="0">
+              <a:buNone/>
+            </a:pPr>
+            <a:r>
+              <a:rPr lang="en-GB" dirty="0"/>
+              <a:t>        </a:t>
+            </a:r>
+            <a:r>
+              <a:rPr lang="en-GB" dirty="0" smtClean="0"/>
+              <a:t>//code to execute</a:t>
+            </a:r>
+            <a:endParaRPr lang="en-GB" dirty="0"/>
+          </a:p>
+          <a:p>
+            <a:pPr marL="400050" lvl="1" indent="0">
+              <a:buNone/>
+            </a:pPr>
+            <a:r>
+              <a:rPr lang="en-GB" dirty="0"/>
+              <a:t>        break;</a:t>
+            </a:r>
+          </a:p>
+          <a:p>
+            <a:pPr marL="400050" lvl="1" indent="0">
+              <a:buNone/>
+            </a:pPr>
+            <a:r>
+              <a:rPr lang="en-GB" dirty="0"/>
+              <a:t>}</a:t>
+            </a:r>
+          </a:p>
+          <a:p>
+            <a:pPr marL="457200" lvl="1" indent="0">
+              <a:buNone/>
+            </a:pPr>
+            <a:endParaRPr lang="en-GB" dirty="0" smtClean="0"/>
+          </a:p>
+          <a:p>
+            <a:pPr marL="57150" indent="0">
+              <a:buNone/>
+            </a:pPr>
+            <a:endParaRPr lang="en-GB" dirty="0" smtClean="0"/>
+          </a:p>
+        </p:txBody>
+      </p:sp>
+    </p:spTree>
+    <p:extLst>
+      <p:ext uri="{BB962C8B-B14F-4D97-AF65-F5344CB8AC3E}">
+        <p14:creationId xmlns:p14="http://schemas.microsoft.com/office/powerpoint/2010/main" val="3665759922"/>
+      </p:ext>
+    </p:extLst>
+  </p:cSld>
+  <p:clrMapOvr>
+    <a:masterClrMapping/>
+  </p:clrMapOvr>
+</p:sld>
+</file>
+
+<file path=ppt/slides/slide7.xml><?xml version="1.0" encoding="utf-8"?>
+<p:sld xmlns:a="http://schemas.openxmlformats.org/drawingml/2006/main" xmlns:r="http://schemas.openxmlformats.org/officeDocument/2006/relationships" xmlns:p="http://schemas.openxmlformats.org/presentationml/2006/main">
+  <p:cSld>
+    <p:spTree>
+      <p:nvGrpSpPr>
+        <p:cNvPr id="1" name=""/>
+        <p:cNvGrpSpPr/>
+        <p:nvPr/>
+      </p:nvGrpSpPr>
+      <p:grpSpPr>
+        <a:xfrm>
+          <a:off x="0" y="0"/>
+          <a:ext cx="0" cy="0"/>
+          <a:chOff x="0" y="0"/>
+          <a:chExt cx="0" cy="0"/>
+        </a:xfrm>
+      </p:grpSpPr>
+      <p:sp>
+        <p:nvSpPr>
+          <p:cNvPr id="2" name="Title 1"/>
+          <p:cNvSpPr>
+            <a:spLocks noGrp="1"/>
+          </p:cNvSpPr>
+          <p:nvPr>
+            <p:ph type="title"/>
+          </p:nvPr>
+        </p:nvSpPr>
+        <p:spPr>
+          <a:xfrm>
+            <a:off x="499717" y="83326"/>
+            <a:ext cx="8596668" cy="515309"/>
+          </a:xfrm>
+        </p:spPr>
+        <p:txBody>
+          <a:bodyPr>
+            <a:normAutofit fontScale="90000"/>
+          </a:bodyPr>
+          <a:lstStyle/>
+          <a:p>
+            <a:r>
+              <a:rPr lang="en-IN" dirty="0" smtClean="0"/>
+              <a:t>Operators</a:t>
+            </a:r>
+            <a:endParaRPr lang="en-GB" dirty="0"/>
+          </a:p>
+        </p:txBody>
+      </p:sp>
+      <p:sp>
+        <p:nvSpPr>
+          <p:cNvPr id="3" name="Content Placeholder 2"/>
+          <p:cNvSpPr>
+            <a:spLocks noGrp="1"/>
+          </p:cNvSpPr>
+          <p:nvPr>
+            <p:ph idx="1"/>
+          </p:nvPr>
+        </p:nvSpPr>
+        <p:spPr>
+          <a:xfrm>
+            <a:off x="677334" y="703891"/>
+            <a:ext cx="8596668" cy="5854791"/>
+          </a:xfrm>
+        </p:spPr>
+        <p:txBody>
+          <a:bodyPr>
+            <a:normAutofit lnSpcReduction="10000"/>
+          </a:bodyPr>
+          <a:lstStyle/>
+          <a:p>
+            <a:r>
+              <a:rPr lang="en-IN" b="1" dirty="0" smtClean="0"/>
+              <a:t>+</a:t>
+            </a:r>
+            <a:r>
+              <a:rPr lang="en-IN" dirty="0" smtClean="0"/>
+              <a:t> used for addition and String concatenation</a:t>
+            </a:r>
+          </a:p>
+          <a:p>
+            <a:r>
+              <a:rPr lang="en-IN" b="1" dirty="0" smtClean="0"/>
+              <a:t>-</a:t>
+            </a:r>
+            <a:r>
+              <a:rPr lang="en-IN" dirty="0" smtClean="0"/>
+              <a:t> used for subtraction</a:t>
+            </a:r>
+          </a:p>
+          <a:p>
+            <a:r>
+              <a:rPr lang="en-IN" b="1" dirty="0" smtClean="0"/>
+              <a:t>*</a:t>
+            </a:r>
+            <a:r>
+              <a:rPr lang="en-IN" dirty="0" smtClean="0"/>
+              <a:t> used for multiplication</a:t>
+            </a:r>
+          </a:p>
+          <a:p>
+            <a:r>
+              <a:rPr lang="en-IN" b="1" dirty="0" smtClean="0"/>
+              <a:t>/</a:t>
+            </a:r>
+            <a:r>
+              <a:rPr lang="en-IN" dirty="0" smtClean="0"/>
+              <a:t> used for division</a:t>
+            </a:r>
+          </a:p>
+          <a:p>
+            <a:r>
+              <a:rPr lang="en-IN" b="1" dirty="0" smtClean="0"/>
+              <a:t>%</a:t>
+            </a:r>
+            <a:r>
+              <a:rPr lang="en-IN" dirty="0" smtClean="0"/>
+              <a:t> used for finding remainder</a:t>
+            </a:r>
+          </a:p>
+          <a:p>
+            <a:r>
+              <a:rPr lang="en-IN" b="1" dirty="0" smtClean="0"/>
+              <a:t>==</a:t>
+            </a:r>
+            <a:r>
+              <a:rPr lang="en-IN" dirty="0" smtClean="0"/>
+              <a:t> equality check on the basis of value</a:t>
+            </a:r>
+          </a:p>
+          <a:p>
+            <a:r>
+              <a:rPr lang="en-IN" b="1" dirty="0" smtClean="0"/>
+              <a:t>===</a:t>
+            </a:r>
+            <a:r>
+              <a:rPr lang="en-IN" dirty="0" smtClean="0"/>
+              <a:t> equality check on the basis of value and type</a:t>
+            </a:r>
+          </a:p>
+          <a:p>
+            <a:r>
+              <a:rPr lang="en-IN" b="1" dirty="0" smtClean="0"/>
+              <a:t>!</a:t>
+            </a:r>
+            <a:r>
+              <a:rPr lang="en-IN" dirty="0" smtClean="0"/>
+              <a:t> Inverting a check</a:t>
+            </a:r>
+          </a:p>
+          <a:p>
+            <a:r>
+              <a:rPr lang="en-IN" b="1" dirty="0" smtClean="0"/>
+              <a:t>&gt;</a:t>
+            </a:r>
+            <a:r>
+              <a:rPr lang="en-IN" dirty="0" smtClean="0"/>
+              <a:t> greater than</a:t>
+            </a:r>
+          </a:p>
+          <a:p>
+            <a:r>
+              <a:rPr lang="en-IN" b="1" dirty="0" smtClean="0"/>
+              <a:t>&gt;=</a:t>
+            </a:r>
+            <a:r>
+              <a:rPr lang="en-IN" dirty="0" smtClean="0"/>
+              <a:t> greater than </a:t>
+            </a:r>
+            <a:r>
+              <a:rPr lang="en-IN" dirty="0" err="1" smtClean="0"/>
+              <a:t>equalto</a:t>
+            </a:r>
+            <a:endParaRPr lang="en-IN" dirty="0" smtClean="0"/>
+          </a:p>
+          <a:p>
+            <a:r>
+              <a:rPr lang="en-IN" b="1" dirty="0" smtClean="0"/>
+              <a:t>&lt;</a:t>
+            </a:r>
+            <a:r>
+              <a:rPr lang="en-IN" dirty="0" smtClean="0"/>
+              <a:t> less than</a:t>
+            </a:r>
+          </a:p>
+          <a:p>
+            <a:r>
+              <a:rPr lang="en-IN" b="1" dirty="0" smtClean="0"/>
+              <a:t>&lt;=</a:t>
+            </a:r>
+            <a:r>
+              <a:rPr lang="en-IN" dirty="0" smtClean="0"/>
+              <a:t> less than equal to</a:t>
+            </a:r>
+          </a:p>
+          <a:p>
+            <a:r>
+              <a:rPr lang="en-IN" b="1" dirty="0" smtClean="0"/>
+              <a:t>&amp;&amp;</a:t>
+            </a:r>
+            <a:r>
+              <a:rPr lang="en-IN" dirty="0" smtClean="0"/>
+              <a:t> logical and</a:t>
+            </a:r>
+          </a:p>
+          <a:p>
+            <a:r>
+              <a:rPr lang="en-IN" b="1" dirty="0" smtClean="0"/>
+              <a:t>||</a:t>
+            </a:r>
+            <a:r>
+              <a:rPr lang="en-IN" dirty="0" smtClean="0"/>
+              <a:t> logical or</a:t>
+            </a:r>
+          </a:p>
+          <a:p>
+            <a:r>
+              <a:rPr lang="en-IN" b="1" dirty="0" smtClean="0"/>
+              <a:t>? :</a:t>
+            </a:r>
+            <a:r>
+              <a:rPr lang="en-IN" dirty="0" smtClean="0"/>
+              <a:t> Ternary operator</a:t>
+            </a:r>
+            <a:endParaRPr lang="en-GB" dirty="0"/>
+          </a:p>
+        </p:txBody>
+      </p:sp>
+    </p:spTree>
+    <p:extLst>
+      <p:ext uri="{BB962C8B-B14F-4D97-AF65-F5344CB8AC3E}">
+        <p14:creationId xmlns:p14="http://schemas.microsoft.com/office/powerpoint/2010/main" val="932779421"/>
+      </p:ext>
+    </p:extLst>
+  </p:cSld>
+  <p:clrMapOvr>
+    <a:masterClrMapping/>
+  </p:clrMapOvr>
+</p:sld>
+</file>
+
+<file path=ppt/slides/slide8.xml><?xml version="1.0" encoding="utf-8"?>
+<p:sld xmlns:a="http://schemas.openxmlformats.org/drawingml/2006/main" xmlns:r="http://schemas.openxmlformats.org/officeDocument/2006/relationships" xmlns:p="http://schemas.openxmlformats.org/presentationml/2006/main">
+  <p:cSld>
+    <p:spTree>
+      <p:nvGrpSpPr>
+        <p:cNvPr id="1" name=""/>
+        <p:cNvGrpSpPr/>
+        <p:nvPr/>
+      </p:nvGrpSpPr>
+      <p:grpSpPr>
+        <a:xfrm>
+          <a:off x="0" y="0"/>
+          <a:ext cx="0" cy="0"/>
+          <a:chOff x="0" y="0"/>
+          <a:chExt cx="0" cy="0"/>
+        </a:xfrm>
+      </p:grpSpPr>
+      <p:sp>
+        <p:nvSpPr>
+          <p:cNvPr id="2" name="Title 1"/>
+          <p:cNvSpPr>
+            <a:spLocks noGrp="1"/>
+          </p:cNvSpPr>
+          <p:nvPr>
+            <p:ph type="title"/>
+          </p:nvPr>
+        </p:nvSpPr>
+        <p:spPr>
+          <a:xfrm>
+            <a:off x="532609" y="50435"/>
+            <a:ext cx="8596668" cy="567937"/>
+          </a:xfrm>
+        </p:spPr>
+        <p:txBody>
+          <a:bodyPr>
+            <a:normAutofit fontScale="90000"/>
+          </a:bodyPr>
+          <a:lstStyle/>
+          <a:p>
+            <a:r>
+              <a:rPr lang="en-IN" dirty="0" smtClean="0"/>
+              <a:t>For Loop</a:t>
+            </a:r>
+            <a:endParaRPr lang="en-GB" dirty="0"/>
+          </a:p>
+        </p:txBody>
+      </p:sp>
+      <p:sp>
+        <p:nvSpPr>
+          <p:cNvPr id="3" name="Content Placeholder 2"/>
+          <p:cNvSpPr>
+            <a:spLocks noGrp="1"/>
+          </p:cNvSpPr>
+          <p:nvPr>
+            <p:ph idx="1"/>
+          </p:nvPr>
+        </p:nvSpPr>
+        <p:spPr>
+          <a:xfrm>
+            <a:off x="677334" y="697312"/>
+            <a:ext cx="8596668" cy="5762693"/>
+          </a:xfrm>
+        </p:spPr>
+        <p:txBody>
+          <a:bodyPr>
+            <a:normAutofit fontScale="92500" lnSpcReduction="10000"/>
+          </a:bodyPr>
+          <a:lstStyle/>
+          <a:p>
+            <a:r>
+              <a:rPr lang="en-IN" dirty="0"/>
+              <a:t>f</a:t>
+            </a:r>
+            <a:r>
+              <a:rPr lang="en-IN" dirty="0" smtClean="0"/>
+              <a:t>or(start; end condition; </a:t>
+            </a:r>
+            <a:r>
+              <a:rPr lang="en-IN" dirty="0" smtClean="0"/>
+              <a:t>counter </a:t>
+            </a:r>
+            <a:r>
+              <a:rPr lang="en-IN" dirty="0" err="1" smtClean="0"/>
+              <a:t>incrementer</a:t>
+            </a:r>
+            <a:r>
+              <a:rPr lang="en-IN" dirty="0" smtClean="0"/>
+              <a:t>/</a:t>
+            </a:r>
+            <a:r>
+              <a:rPr lang="en-IN" dirty="0" err="1" smtClean="0"/>
+              <a:t>Decrementer</a:t>
+            </a:r>
+            <a:r>
+              <a:rPr lang="en-IN" dirty="0" smtClean="0"/>
+              <a:t>;){</a:t>
+            </a:r>
+            <a:endParaRPr lang="en-IN" dirty="0" smtClean="0"/>
+          </a:p>
+          <a:p>
+            <a:pPr marL="400050" lvl="1" indent="0">
+              <a:buNone/>
+            </a:pPr>
+            <a:r>
+              <a:rPr lang="en-IN" dirty="0" smtClean="0"/>
+              <a:t>//loop body</a:t>
+            </a:r>
+            <a:endParaRPr lang="en-IN" dirty="0"/>
+          </a:p>
+          <a:p>
+            <a:pPr marL="400050" lvl="1" indent="0">
+              <a:buNone/>
+            </a:pPr>
+            <a:r>
+              <a:rPr lang="en-IN" dirty="0" smtClean="0"/>
+              <a:t>}</a:t>
+            </a:r>
+          </a:p>
+          <a:p>
+            <a:r>
+              <a:rPr lang="en-IN" dirty="0"/>
+              <a:t>for(start; end condition; counter </a:t>
+            </a:r>
+            <a:r>
+              <a:rPr lang="en-IN" dirty="0" err="1"/>
+              <a:t>incrementer</a:t>
+            </a:r>
+            <a:r>
+              <a:rPr lang="en-IN" dirty="0"/>
+              <a:t>/</a:t>
+            </a:r>
+            <a:r>
+              <a:rPr lang="en-IN" dirty="0" err="1"/>
+              <a:t>Decrementer</a:t>
+            </a:r>
+            <a:r>
+              <a:rPr lang="en-IN" dirty="0"/>
+              <a:t>;){</a:t>
+            </a:r>
+          </a:p>
+          <a:p>
+            <a:pPr marL="400050" lvl="1" indent="0">
+              <a:buNone/>
+            </a:pPr>
+            <a:r>
+              <a:rPr lang="en-IN" dirty="0" smtClean="0"/>
+              <a:t>If(//some condition){</a:t>
+            </a:r>
+          </a:p>
+          <a:p>
+            <a:pPr marL="400050" lvl="1" indent="0">
+              <a:buNone/>
+            </a:pPr>
+            <a:r>
+              <a:rPr lang="en-IN" dirty="0" smtClean="0"/>
+              <a:t>//some code </a:t>
+            </a:r>
+          </a:p>
+          <a:p>
+            <a:pPr marL="400050" lvl="1" indent="0">
+              <a:buNone/>
+            </a:pPr>
+            <a:r>
+              <a:rPr lang="en-IN" dirty="0"/>
+              <a:t>b</a:t>
+            </a:r>
+            <a:r>
+              <a:rPr lang="en-IN" dirty="0" smtClean="0"/>
+              <a:t>reak;</a:t>
+            </a:r>
+            <a:endParaRPr lang="en-IN" dirty="0"/>
+          </a:p>
+          <a:p>
+            <a:pPr marL="400050" lvl="1" indent="0">
+              <a:buNone/>
+            </a:pPr>
+            <a:r>
+              <a:rPr lang="en-IN" dirty="0" smtClean="0"/>
+              <a:t>}</a:t>
+            </a:r>
+          </a:p>
+          <a:p>
+            <a:pPr marL="400050" lvl="1" indent="0">
+              <a:buNone/>
+            </a:pPr>
+            <a:r>
+              <a:rPr lang="en-IN" dirty="0" smtClean="0"/>
+              <a:t>//some code</a:t>
+            </a:r>
+            <a:endParaRPr lang="en-IN" dirty="0"/>
+          </a:p>
+          <a:p>
+            <a:pPr marL="400050" lvl="1" indent="0">
+              <a:buNone/>
+            </a:pPr>
+            <a:r>
+              <a:rPr lang="en-IN" dirty="0" smtClean="0"/>
+              <a:t>}</a:t>
+            </a:r>
+          </a:p>
+          <a:p>
+            <a:r>
+              <a:rPr lang="en-IN" dirty="0"/>
+              <a:t>for(start; end condition; counter </a:t>
+            </a:r>
+            <a:r>
+              <a:rPr lang="en-IN" dirty="0" err="1"/>
+              <a:t>incrementer</a:t>
+            </a:r>
+            <a:r>
+              <a:rPr lang="en-IN" dirty="0"/>
+              <a:t>/</a:t>
+            </a:r>
+            <a:r>
+              <a:rPr lang="en-IN" dirty="0" err="1"/>
+              <a:t>Decrementer</a:t>
+            </a:r>
+            <a:r>
+              <a:rPr lang="en-IN" dirty="0"/>
+              <a:t>;){</a:t>
+            </a:r>
+          </a:p>
+          <a:p>
+            <a:pPr marL="400050" lvl="1" indent="0">
+              <a:buNone/>
+            </a:pPr>
+            <a:r>
+              <a:rPr lang="en-IN" dirty="0"/>
+              <a:t>If(//some condition){</a:t>
+            </a:r>
+          </a:p>
+          <a:p>
+            <a:pPr marL="400050" lvl="1" indent="0">
+              <a:buNone/>
+            </a:pPr>
+            <a:r>
+              <a:rPr lang="en-IN" dirty="0"/>
+              <a:t>//some code </a:t>
+            </a:r>
+          </a:p>
+          <a:p>
+            <a:pPr marL="400050" lvl="1" indent="0">
+              <a:buNone/>
+            </a:pPr>
+            <a:r>
+              <a:rPr lang="en-IN" dirty="0" smtClean="0"/>
+              <a:t>continue;</a:t>
+            </a:r>
+            <a:endParaRPr lang="en-IN" dirty="0"/>
+          </a:p>
+          <a:p>
+            <a:pPr marL="400050" lvl="1" indent="0">
+              <a:buNone/>
+            </a:pPr>
+            <a:r>
+              <a:rPr lang="en-IN" dirty="0"/>
+              <a:t>}</a:t>
+            </a:r>
+          </a:p>
+          <a:p>
+            <a:pPr marL="400050" lvl="1" indent="0">
+              <a:buNone/>
+            </a:pPr>
+            <a:r>
+              <a:rPr lang="en-IN" dirty="0"/>
+              <a:t>//some code</a:t>
+            </a:r>
+          </a:p>
+          <a:p>
+            <a:pPr marL="400050" lvl="1" indent="0">
+              <a:buNone/>
+            </a:pPr>
+            <a:r>
+              <a:rPr lang="en-IN" dirty="0"/>
+              <a:t>}</a:t>
+            </a:r>
+          </a:p>
+          <a:p>
+            <a:pPr marL="400050" lvl="1" indent="0">
+              <a:buNone/>
+            </a:pPr>
+            <a:endParaRPr lang="en-GB" dirty="0"/>
+          </a:p>
+          <a:p>
+            <a:pPr marL="400050" lvl="1" indent="0">
+              <a:buNone/>
+            </a:pPr>
+            <a:endParaRPr lang="en-GB" dirty="0"/>
+          </a:p>
+        </p:txBody>
+      </p:sp>
+    </p:spTree>
+    <p:extLst>
+      <p:ext uri="{BB962C8B-B14F-4D97-AF65-F5344CB8AC3E}">
+        <p14:creationId xmlns:p14="http://schemas.microsoft.com/office/powerpoint/2010/main" val="2776148606"/>
+      </p:ext>
+    </p:extLst>
+  </p:cSld>
+  <p:clrMapOvr>
+    <a:masterClrMapping/>
+  </p:clrMapOvr>
+</p:sld>
+</file>
+
+<file path=ppt/slides/slide9.xml><?xml version="1.0" encoding="utf-8"?>
+<p:sld xmlns:a="http://schemas.openxmlformats.org/drawingml/2006/main" xmlns:r="http://schemas.openxmlformats.org/officeDocument/2006/relationships" xmlns:p="http://schemas.openxmlformats.org/presentationml/2006/main">
+  <p:cSld>
+    <p:spTree>
+      <p:nvGrpSpPr>
+        <p:cNvPr id="1" name=""/>
+        <p:cNvGrpSpPr/>
+        <p:nvPr/>
+      </p:nvGrpSpPr>
+      <p:grpSpPr>
+        <a:xfrm>
+          <a:off x="0" y="0"/>
+          <a:ext cx="0" cy="0"/>
+          <a:chOff x="0" y="0"/>
+          <a:chExt cx="0" cy="0"/>
+        </a:xfrm>
+      </p:grpSpPr>
+      <p:sp>
+        <p:nvSpPr>
+          <p:cNvPr id="2" name="Title 1"/>
+          <p:cNvSpPr>
+            <a:spLocks noGrp="1"/>
+          </p:cNvSpPr>
+          <p:nvPr>
+            <p:ph type="title"/>
+          </p:nvPr>
+        </p:nvSpPr>
+        <p:spPr>
+          <a:xfrm>
+            <a:off x="352869" y="88490"/>
+            <a:ext cx="8596668" cy="530942"/>
+          </a:xfrm>
+        </p:spPr>
+        <p:txBody>
+          <a:bodyPr>
+            <a:normAutofit fontScale="90000"/>
+          </a:bodyPr>
+          <a:lstStyle/>
+          <a:p>
+            <a:r>
+              <a:rPr lang="en-GB" dirty="0" smtClean="0"/>
+              <a:t>While Loop</a:t>
+            </a:r>
+            <a:endParaRPr lang="en-GB" dirty="0"/>
+          </a:p>
+        </p:txBody>
+      </p:sp>
+      <p:sp>
+        <p:nvSpPr>
+          <p:cNvPr id="3" name="Content Placeholder 2"/>
+          <p:cNvSpPr>
+            <a:spLocks noGrp="1"/>
+          </p:cNvSpPr>
+          <p:nvPr>
+            <p:ph idx="1"/>
+          </p:nvPr>
+        </p:nvSpPr>
+        <p:spPr>
+          <a:xfrm>
+            <a:off x="677334" y="688259"/>
+            <a:ext cx="8596668" cy="5353104"/>
+          </a:xfrm>
+        </p:spPr>
+        <p:txBody>
+          <a:bodyPr/>
+          <a:lstStyle/>
+          <a:p>
+            <a:r>
+              <a:rPr lang="en-GB" dirty="0"/>
+              <a:t>w</a:t>
+            </a:r>
+            <a:r>
+              <a:rPr lang="en-GB" dirty="0" smtClean="0"/>
+              <a:t>hile(//termination condition){</a:t>
+            </a:r>
+          </a:p>
+          <a:p>
+            <a:pPr marL="400050" lvl="1" indent="0">
+              <a:buNone/>
+            </a:pPr>
+            <a:r>
+              <a:rPr lang="en-GB" dirty="0" smtClean="0"/>
+              <a:t>//loop body</a:t>
+            </a:r>
+          </a:p>
+          <a:p>
+            <a:pPr marL="400050" lvl="1" indent="0">
+              <a:buNone/>
+            </a:pPr>
+            <a:r>
+              <a:rPr lang="en-GB" dirty="0" smtClean="0"/>
+              <a:t>//increment/decrement counter to eventually reach termination condition</a:t>
+            </a:r>
+            <a:endParaRPr lang="en-GB" dirty="0"/>
+          </a:p>
+          <a:p>
+            <a:pPr marL="400050" lvl="1" indent="0">
+              <a:buNone/>
+            </a:pPr>
+            <a:r>
+              <a:rPr lang="en-GB" dirty="0" smtClean="0"/>
+              <a:t>}</a:t>
+            </a:r>
+            <a:endParaRPr lang="en-GB" dirty="0"/>
+          </a:p>
+        </p:txBody>
+      </p:sp>
+    </p:spTree>
+    <p:extLst>
+      <p:ext uri="{BB962C8B-B14F-4D97-AF65-F5344CB8AC3E}">
+        <p14:creationId xmlns:p14="http://schemas.microsoft.com/office/powerpoint/2010/main" val="1021687471"/>
       </p:ext>
     </p:extLst>
   </p:cSld>

</xml_diff>